<commit_message>
postavljeno za svih 7 mikrofrontenda slajdovi
</commit_message>
<xml_diff>
--- a/Diplomski rad.pptx
+++ b/Diplomski rad.pptx
@@ -4,11 +4,19 @@
   <p:sldMasterIdLst>
     <p:sldMasterId id="2147483720" r:id="rId1"/>
   </p:sldMasterIdLst>
+  <p:notesMasterIdLst>
+    <p:notesMasterId r:id="rId11"/>
+  </p:notesMasterIdLst>
   <p:sldIdLst>
     <p:sldId id="256" r:id="rId2"/>
     <p:sldId id="257" r:id="rId3"/>
     <p:sldId id="258" r:id="rId4"/>
     <p:sldId id="259" r:id="rId5"/>
+    <p:sldId id="260" r:id="rId6"/>
+    <p:sldId id="261" r:id="rId7"/>
+    <p:sldId id="262" r:id="rId8"/>
+    <p:sldId id="263" r:id="rId9"/>
+    <p:sldId id="264" r:id="rId10"/>
   </p:sldIdLst>
   <p:sldSz cx="12192000" cy="6858000"/>
   <p:notesSz cx="6858000" cy="9144000"/>
@@ -107,7 +115,530 @@
       </a:defRPr>
     </a:lvl9pPr>
   </p:defaultTextStyle>
+  <p:extLst>
+    <p:ext uri="{EFAFB233-063F-42B5-8137-9DF3F51BA10A}">
+      <p15:sldGuideLst xmlns:p15="http://schemas.microsoft.com/office/powerpoint/2012/main"/>
+    </p:ext>
+  </p:extLst>
 </p:presentation>
+</file>
+
+<file path=ppt/notesMasters/notesMaster1.xml><?xml version="1.0" encoding="utf-8"?>
+<p:notesMaster xmlns:a="http://schemas.openxmlformats.org/drawingml/2006/main" xmlns:r="http://schemas.openxmlformats.org/officeDocument/2006/relationships" xmlns:p="http://schemas.openxmlformats.org/presentationml/2006/main">
+  <p:cSld>
+    <p:bg>
+      <p:bgRef idx="1001">
+        <a:schemeClr val="bg1"/>
+      </p:bgRef>
+    </p:bg>
+    <p:spTree>
+      <p:nvGrpSpPr>
+        <p:cNvPr id="1" name=""/>
+        <p:cNvGrpSpPr/>
+        <p:nvPr/>
+      </p:nvGrpSpPr>
+      <p:grpSpPr>
+        <a:xfrm>
+          <a:off x="0" y="0"/>
+          <a:ext cx="0" cy="0"/>
+          <a:chOff x="0" y="0"/>
+          <a:chExt cx="0" cy="0"/>
+        </a:xfrm>
+      </p:grpSpPr>
+      <p:sp>
+        <p:nvSpPr>
+          <p:cNvPr id="2" name="Header Placeholder 1"/>
+          <p:cNvSpPr>
+            <a:spLocks noGrp="1"/>
+          </p:cNvSpPr>
+          <p:nvPr>
+            <p:ph type="hdr" sz="quarter"/>
+          </p:nvPr>
+        </p:nvSpPr>
+        <p:spPr>
+          <a:xfrm>
+            <a:off x="0" y="0"/>
+            <a:ext cx="2971800" cy="458788"/>
+          </a:xfrm>
+          <a:prstGeom prst="rect">
+            <a:avLst/>
+          </a:prstGeom>
+        </p:spPr>
+        <p:txBody>
+          <a:bodyPr vert="horz" lIns="91440" tIns="45720" rIns="91440" bIns="45720" rtlCol="0"/>
+          <a:lstStyle>
+            <a:lvl1pPr algn="l">
+              <a:defRPr sz="1200"/>
+            </a:lvl1pPr>
+          </a:lstStyle>
+          <a:p>
+            <a:endParaRPr lang="sr-Latn-RS"/>
+          </a:p>
+        </p:txBody>
+      </p:sp>
+      <p:sp>
+        <p:nvSpPr>
+          <p:cNvPr id="3" name="Date Placeholder 2"/>
+          <p:cNvSpPr>
+            <a:spLocks noGrp="1"/>
+          </p:cNvSpPr>
+          <p:nvPr>
+            <p:ph type="dt" idx="1"/>
+          </p:nvPr>
+        </p:nvSpPr>
+        <p:spPr>
+          <a:xfrm>
+            <a:off x="3884613" y="0"/>
+            <a:ext cx="2971800" cy="458788"/>
+          </a:xfrm>
+          <a:prstGeom prst="rect">
+            <a:avLst/>
+          </a:prstGeom>
+        </p:spPr>
+        <p:txBody>
+          <a:bodyPr vert="horz" lIns="91440" tIns="45720" rIns="91440" bIns="45720" rtlCol="0"/>
+          <a:lstStyle>
+            <a:lvl1pPr algn="r">
+              <a:defRPr sz="1200"/>
+            </a:lvl1pPr>
+          </a:lstStyle>
+          <a:p>
+            <a:fld id="{D587FBED-B7F9-4131-93F4-470C02CC7AFD}" type="datetimeFigureOut">
+              <a:rPr lang="sr-Latn-RS" smtClean="0"/>
+              <a:t>18.12.2023.</a:t>
+            </a:fld>
+            <a:endParaRPr lang="sr-Latn-RS"/>
+          </a:p>
+        </p:txBody>
+      </p:sp>
+      <p:sp>
+        <p:nvSpPr>
+          <p:cNvPr id="4" name="Slide Image Placeholder 3"/>
+          <p:cNvSpPr>
+            <a:spLocks noGrp="1" noRot="1" noChangeAspect="1"/>
+          </p:cNvSpPr>
+          <p:nvPr>
+            <p:ph type="sldImg" idx="2"/>
+          </p:nvPr>
+        </p:nvSpPr>
+        <p:spPr>
+          <a:xfrm>
+            <a:off x="685800" y="1143000"/>
+            <a:ext cx="5486400" cy="3086100"/>
+          </a:xfrm>
+          <a:prstGeom prst="rect">
+            <a:avLst/>
+          </a:prstGeom>
+          <a:noFill/>
+          <a:ln w="12700">
+            <a:solidFill>
+              <a:prstClr val="black"/>
+            </a:solidFill>
+          </a:ln>
+        </p:spPr>
+        <p:txBody>
+          <a:bodyPr vert="horz" lIns="91440" tIns="45720" rIns="91440" bIns="45720" rtlCol="0" anchor="ctr"/>
+          <a:lstStyle/>
+          <a:p>
+            <a:endParaRPr lang="sr-Latn-RS"/>
+          </a:p>
+        </p:txBody>
+      </p:sp>
+      <p:sp>
+        <p:nvSpPr>
+          <p:cNvPr id="5" name="Notes Placeholder 4"/>
+          <p:cNvSpPr>
+            <a:spLocks noGrp="1"/>
+          </p:cNvSpPr>
+          <p:nvPr>
+            <p:ph type="body" sz="quarter" idx="3"/>
+          </p:nvPr>
+        </p:nvSpPr>
+        <p:spPr>
+          <a:xfrm>
+            <a:off x="685800" y="4400550"/>
+            <a:ext cx="5486400" cy="3600450"/>
+          </a:xfrm>
+          <a:prstGeom prst="rect">
+            <a:avLst/>
+          </a:prstGeom>
+        </p:spPr>
+        <p:txBody>
+          <a:bodyPr vert="horz" lIns="91440" tIns="45720" rIns="91440" bIns="45720" rtlCol="0"/>
+          <a:lstStyle/>
+          <a:p>
+            <a:pPr lvl="0"/>
+            <a:r>
+              <a:rPr lang="en-US"/>
+              <a:t>Click to edit Master text styles</a:t>
+            </a:r>
+          </a:p>
+          <a:p>
+            <a:pPr lvl="1"/>
+            <a:r>
+              <a:rPr lang="en-US"/>
+              <a:t>Second level</a:t>
+            </a:r>
+          </a:p>
+          <a:p>
+            <a:pPr lvl="2"/>
+            <a:r>
+              <a:rPr lang="en-US"/>
+              <a:t>Third level</a:t>
+            </a:r>
+          </a:p>
+          <a:p>
+            <a:pPr lvl="3"/>
+            <a:r>
+              <a:rPr lang="en-US"/>
+              <a:t>Fourth level</a:t>
+            </a:r>
+          </a:p>
+          <a:p>
+            <a:pPr lvl="4"/>
+            <a:r>
+              <a:rPr lang="en-US"/>
+              <a:t>Fifth level</a:t>
+            </a:r>
+            <a:endParaRPr lang="sr-Latn-RS"/>
+          </a:p>
+        </p:txBody>
+      </p:sp>
+      <p:sp>
+        <p:nvSpPr>
+          <p:cNvPr id="6" name="Footer Placeholder 5"/>
+          <p:cNvSpPr>
+            <a:spLocks noGrp="1"/>
+          </p:cNvSpPr>
+          <p:nvPr>
+            <p:ph type="ftr" sz="quarter" idx="4"/>
+          </p:nvPr>
+        </p:nvSpPr>
+        <p:spPr>
+          <a:xfrm>
+            <a:off x="0" y="8685213"/>
+            <a:ext cx="2971800" cy="458787"/>
+          </a:xfrm>
+          <a:prstGeom prst="rect">
+            <a:avLst/>
+          </a:prstGeom>
+        </p:spPr>
+        <p:txBody>
+          <a:bodyPr vert="horz" lIns="91440" tIns="45720" rIns="91440" bIns="45720" rtlCol="0" anchor="b"/>
+          <a:lstStyle>
+            <a:lvl1pPr algn="l">
+              <a:defRPr sz="1200"/>
+            </a:lvl1pPr>
+          </a:lstStyle>
+          <a:p>
+            <a:endParaRPr lang="sr-Latn-RS"/>
+          </a:p>
+        </p:txBody>
+      </p:sp>
+      <p:sp>
+        <p:nvSpPr>
+          <p:cNvPr id="7" name="Slide Number Placeholder 6"/>
+          <p:cNvSpPr>
+            <a:spLocks noGrp="1"/>
+          </p:cNvSpPr>
+          <p:nvPr>
+            <p:ph type="sldNum" sz="quarter" idx="5"/>
+          </p:nvPr>
+        </p:nvSpPr>
+        <p:spPr>
+          <a:xfrm>
+            <a:off x="3884613" y="8685213"/>
+            <a:ext cx="2971800" cy="458787"/>
+          </a:xfrm>
+          <a:prstGeom prst="rect">
+            <a:avLst/>
+          </a:prstGeom>
+        </p:spPr>
+        <p:txBody>
+          <a:bodyPr vert="horz" lIns="91440" tIns="45720" rIns="91440" bIns="45720" rtlCol="0" anchor="b"/>
+          <a:lstStyle>
+            <a:lvl1pPr algn="r">
+              <a:defRPr sz="1200"/>
+            </a:lvl1pPr>
+          </a:lstStyle>
+          <a:p>
+            <a:fld id="{C03CDDB8-57EB-4E21-9D41-14D5805C3B7C}" type="slidenum">
+              <a:rPr lang="sr-Latn-RS" smtClean="0"/>
+              <a:t>‹#›</a:t>
+            </a:fld>
+            <a:endParaRPr lang="sr-Latn-RS"/>
+          </a:p>
+        </p:txBody>
+      </p:sp>
+    </p:spTree>
+    <p:extLst>
+      <p:ext uri="{BB962C8B-B14F-4D97-AF65-F5344CB8AC3E}">
+        <p14:creationId xmlns:p14="http://schemas.microsoft.com/office/powerpoint/2010/main" val="266239447"/>
+      </p:ext>
+    </p:extLst>
+  </p:cSld>
+  <p:clrMap bg1="lt1" tx1="dk1" bg2="lt2" tx2="dk2" accent1="accent1" accent2="accent2" accent3="accent3" accent4="accent4" accent5="accent5" accent6="accent6" hlink="hlink" folHlink="folHlink"/>
+  <p:notesStyle>
+    <a:lvl1pPr marL="0" algn="l" defTabSz="914400" rtl="0" eaLnBrk="1" latinLnBrk="0" hangingPunct="1">
+      <a:defRPr sz="1200" kern="1200">
+        <a:solidFill>
+          <a:schemeClr val="tx1"/>
+        </a:solidFill>
+        <a:latin typeface="+mn-lt"/>
+        <a:ea typeface="+mn-ea"/>
+        <a:cs typeface="+mn-cs"/>
+      </a:defRPr>
+    </a:lvl1pPr>
+    <a:lvl2pPr marL="457200" algn="l" defTabSz="914400" rtl="0" eaLnBrk="1" latinLnBrk="0" hangingPunct="1">
+      <a:defRPr sz="1200" kern="1200">
+        <a:solidFill>
+          <a:schemeClr val="tx1"/>
+        </a:solidFill>
+        <a:latin typeface="+mn-lt"/>
+        <a:ea typeface="+mn-ea"/>
+        <a:cs typeface="+mn-cs"/>
+      </a:defRPr>
+    </a:lvl2pPr>
+    <a:lvl3pPr marL="914400" algn="l" defTabSz="914400" rtl="0" eaLnBrk="1" latinLnBrk="0" hangingPunct="1">
+      <a:defRPr sz="1200" kern="1200">
+        <a:solidFill>
+          <a:schemeClr val="tx1"/>
+        </a:solidFill>
+        <a:latin typeface="+mn-lt"/>
+        <a:ea typeface="+mn-ea"/>
+        <a:cs typeface="+mn-cs"/>
+      </a:defRPr>
+    </a:lvl3pPr>
+    <a:lvl4pPr marL="1371600" algn="l" defTabSz="914400" rtl="0" eaLnBrk="1" latinLnBrk="0" hangingPunct="1">
+      <a:defRPr sz="1200" kern="1200">
+        <a:solidFill>
+          <a:schemeClr val="tx1"/>
+        </a:solidFill>
+        <a:latin typeface="+mn-lt"/>
+        <a:ea typeface="+mn-ea"/>
+        <a:cs typeface="+mn-cs"/>
+      </a:defRPr>
+    </a:lvl4pPr>
+    <a:lvl5pPr marL="1828800" algn="l" defTabSz="914400" rtl="0" eaLnBrk="1" latinLnBrk="0" hangingPunct="1">
+      <a:defRPr sz="1200" kern="1200">
+        <a:solidFill>
+          <a:schemeClr val="tx1"/>
+        </a:solidFill>
+        <a:latin typeface="+mn-lt"/>
+        <a:ea typeface="+mn-ea"/>
+        <a:cs typeface="+mn-cs"/>
+      </a:defRPr>
+    </a:lvl5pPr>
+    <a:lvl6pPr marL="2286000" algn="l" defTabSz="914400" rtl="0" eaLnBrk="1" latinLnBrk="0" hangingPunct="1">
+      <a:defRPr sz="1200" kern="1200">
+        <a:solidFill>
+          <a:schemeClr val="tx1"/>
+        </a:solidFill>
+        <a:latin typeface="+mn-lt"/>
+        <a:ea typeface="+mn-ea"/>
+        <a:cs typeface="+mn-cs"/>
+      </a:defRPr>
+    </a:lvl6pPr>
+    <a:lvl7pPr marL="2743200" algn="l" defTabSz="914400" rtl="0" eaLnBrk="1" latinLnBrk="0" hangingPunct="1">
+      <a:defRPr sz="1200" kern="1200">
+        <a:solidFill>
+          <a:schemeClr val="tx1"/>
+        </a:solidFill>
+        <a:latin typeface="+mn-lt"/>
+        <a:ea typeface="+mn-ea"/>
+        <a:cs typeface="+mn-cs"/>
+      </a:defRPr>
+    </a:lvl7pPr>
+    <a:lvl8pPr marL="3200400" algn="l" defTabSz="914400" rtl="0" eaLnBrk="1" latinLnBrk="0" hangingPunct="1">
+      <a:defRPr sz="1200" kern="1200">
+        <a:solidFill>
+          <a:schemeClr val="tx1"/>
+        </a:solidFill>
+        <a:latin typeface="+mn-lt"/>
+        <a:ea typeface="+mn-ea"/>
+        <a:cs typeface="+mn-cs"/>
+      </a:defRPr>
+    </a:lvl8pPr>
+    <a:lvl9pPr marL="3657600" algn="l" defTabSz="914400" rtl="0" eaLnBrk="1" latinLnBrk="0" hangingPunct="1">
+      <a:defRPr sz="1200" kern="1200">
+        <a:solidFill>
+          <a:schemeClr val="tx1"/>
+        </a:solidFill>
+        <a:latin typeface="+mn-lt"/>
+        <a:ea typeface="+mn-ea"/>
+        <a:cs typeface="+mn-cs"/>
+      </a:defRPr>
+    </a:lvl9pPr>
+  </p:notesStyle>
+</p:notesMaster>
+</file>
+
+<file path=ppt/notesSlides/notesSlide1.xml><?xml version="1.0" encoding="utf-8"?>
+<p:notes xmlns:a="http://schemas.openxmlformats.org/drawingml/2006/main" xmlns:r="http://schemas.openxmlformats.org/officeDocument/2006/relationships" xmlns:p="http://schemas.openxmlformats.org/presentationml/2006/main">
+  <p:cSld>
+    <p:spTree>
+      <p:nvGrpSpPr>
+        <p:cNvPr id="1" name=""/>
+        <p:cNvGrpSpPr/>
+        <p:nvPr/>
+      </p:nvGrpSpPr>
+      <p:grpSpPr>
+        <a:xfrm>
+          <a:off x="0" y="0"/>
+          <a:ext cx="0" cy="0"/>
+          <a:chOff x="0" y="0"/>
+          <a:chExt cx="0" cy="0"/>
+        </a:xfrm>
+      </p:grpSpPr>
+      <p:sp>
+        <p:nvSpPr>
+          <p:cNvPr id="2" name="Slide Image Placeholder 1"/>
+          <p:cNvSpPr>
+            <a:spLocks noGrp="1" noRot="1" noChangeAspect="1"/>
+          </p:cNvSpPr>
+          <p:nvPr>
+            <p:ph type="sldImg"/>
+          </p:nvPr>
+        </p:nvSpPr>
+        <p:spPr/>
+      </p:sp>
+      <p:sp>
+        <p:nvSpPr>
+          <p:cNvPr id="3" name="Notes Placeholder 2"/>
+          <p:cNvSpPr>
+            <a:spLocks noGrp="1"/>
+          </p:cNvSpPr>
+          <p:nvPr>
+            <p:ph type="body" idx="1"/>
+          </p:nvPr>
+        </p:nvSpPr>
+        <p:spPr/>
+        <p:txBody>
+          <a:bodyPr/>
+          <a:lstStyle/>
+          <a:p>
+            <a:endParaRPr lang="sr-Latn-RS" dirty="0"/>
+          </a:p>
+        </p:txBody>
+      </p:sp>
+      <p:sp>
+        <p:nvSpPr>
+          <p:cNvPr id="4" name="Slide Number Placeholder 3"/>
+          <p:cNvSpPr>
+            <a:spLocks noGrp="1"/>
+          </p:cNvSpPr>
+          <p:nvPr>
+            <p:ph type="sldNum" sz="quarter" idx="5"/>
+          </p:nvPr>
+        </p:nvSpPr>
+        <p:spPr/>
+        <p:txBody>
+          <a:bodyPr/>
+          <a:lstStyle/>
+          <a:p>
+            <a:fld id="{C03CDDB8-57EB-4E21-9D41-14D5805C3B7C}" type="slidenum">
+              <a:rPr lang="sr-Latn-RS" smtClean="0"/>
+              <a:t>1</a:t>
+            </a:fld>
+            <a:endParaRPr lang="sr-Latn-RS"/>
+          </a:p>
+        </p:txBody>
+      </p:sp>
+    </p:spTree>
+    <p:extLst>
+      <p:ext uri="{BB962C8B-B14F-4D97-AF65-F5344CB8AC3E}">
+        <p14:creationId xmlns:p14="http://schemas.microsoft.com/office/powerpoint/2010/main" val="972034460"/>
+      </p:ext>
+    </p:extLst>
+  </p:cSld>
+  <p:clrMapOvr>
+    <a:masterClrMapping/>
+  </p:clrMapOvr>
+</p:notes>
+</file>
+
+<file path=ppt/notesSlides/notesSlide2.xml><?xml version="1.0" encoding="utf-8"?>
+<p:notes xmlns:a="http://schemas.openxmlformats.org/drawingml/2006/main" xmlns:r="http://schemas.openxmlformats.org/officeDocument/2006/relationships" xmlns:p="http://schemas.openxmlformats.org/presentationml/2006/main">
+  <p:cSld>
+    <p:spTree>
+      <p:nvGrpSpPr>
+        <p:cNvPr id="1" name=""/>
+        <p:cNvGrpSpPr/>
+        <p:nvPr/>
+      </p:nvGrpSpPr>
+      <p:grpSpPr>
+        <a:xfrm>
+          <a:off x="0" y="0"/>
+          <a:ext cx="0" cy="0"/>
+          <a:chOff x="0" y="0"/>
+          <a:chExt cx="0" cy="0"/>
+        </a:xfrm>
+      </p:grpSpPr>
+      <p:sp>
+        <p:nvSpPr>
+          <p:cNvPr id="2" name="Slide Image Placeholder 1"/>
+          <p:cNvSpPr>
+            <a:spLocks noGrp="1" noRot="1" noChangeAspect="1"/>
+          </p:cNvSpPr>
+          <p:nvPr>
+            <p:ph type="sldImg"/>
+          </p:nvPr>
+        </p:nvSpPr>
+        <p:spPr/>
+      </p:sp>
+      <p:sp>
+        <p:nvSpPr>
+          <p:cNvPr id="3" name="Notes Placeholder 2"/>
+          <p:cNvSpPr>
+            <a:spLocks noGrp="1"/>
+          </p:cNvSpPr>
+          <p:nvPr>
+            <p:ph type="body" idx="1"/>
+          </p:nvPr>
+        </p:nvSpPr>
+        <p:spPr/>
+        <p:txBody>
+          <a:bodyPr/>
+          <a:lstStyle/>
+          <a:p>
+            <a:endParaRPr lang="sr-Latn-RS" dirty="0"/>
+          </a:p>
+        </p:txBody>
+      </p:sp>
+      <p:sp>
+        <p:nvSpPr>
+          <p:cNvPr id="4" name="Slide Number Placeholder 3"/>
+          <p:cNvSpPr>
+            <a:spLocks noGrp="1"/>
+          </p:cNvSpPr>
+          <p:nvPr>
+            <p:ph type="sldNum" sz="quarter" idx="5"/>
+          </p:nvPr>
+        </p:nvSpPr>
+        <p:spPr/>
+        <p:txBody>
+          <a:bodyPr/>
+          <a:lstStyle/>
+          <a:p>
+            <a:fld id="{C03CDDB8-57EB-4E21-9D41-14D5805C3B7C}" type="slidenum">
+              <a:rPr lang="sr-Latn-RS" smtClean="0"/>
+              <a:t>9</a:t>
+            </a:fld>
+            <a:endParaRPr lang="sr-Latn-RS"/>
+          </a:p>
+        </p:txBody>
+      </p:sp>
+    </p:spTree>
+    <p:extLst>
+      <p:ext uri="{BB962C8B-B14F-4D97-AF65-F5344CB8AC3E}">
+        <p14:creationId xmlns:p14="http://schemas.microsoft.com/office/powerpoint/2010/main" val="1382161270"/>
+      </p:ext>
+    </p:extLst>
+  </p:cSld>
+  <p:clrMapOvr>
+    <a:masterClrMapping/>
+  </p:clrMapOvr>
+</p:notes>
 </file>
 
 <file path=ppt/slideLayouts/slideLayout1.xml><?xml version="1.0" encoding="utf-8"?>
@@ -4390,12 +4921,20 @@
               <a:t>. </a:t>
             </a:r>
             <a:r>
+              <a:rPr lang="en-US" dirty="0"/>
+              <a:t>M</a:t>
+            </a:r>
+            <a:r>
               <a:rPr lang="sr-Latn-RS" dirty="0" err="1"/>
-              <a:t>Standradni</a:t>
+              <a:t>onolit</a:t>
+            </a:r>
+            <a:r>
+              <a:rPr lang="en-US" dirty="0"/>
+              <a:t>n</a:t>
             </a:r>
             <a:r>
               <a:rPr lang="sr-Latn-RS" dirty="0"/>
-              <a:t> (monoliti) pristup</a:t>
+              <a:t>i pristup</a:t>
             </a:r>
           </a:p>
         </p:txBody>
@@ -4525,12 +5064,626 @@
           </a:p>
         </p:txBody>
       </p:sp>
+      <p:grpSp>
+        <p:nvGrpSpPr>
+          <p:cNvPr id="10" name="Group 9">
+            <a:extLst>
+              <a:ext uri="{FF2B5EF4-FFF2-40B4-BE49-F238E27FC236}">
+                <a16:creationId xmlns:a16="http://schemas.microsoft.com/office/drawing/2014/main" id="{CC3552C3-079A-BB55-ACF4-8FD4AFC109A8}"/>
+              </a:ext>
+            </a:extLst>
+          </p:cNvPr>
+          <p:cNvGrpSpPr/>
+          <p:nvPr/>
+        </p:nvGrpSpPr>
+        <p:grpSpPr>
+          <a:xfrm>
+            <a:off x="4630592" y="2161415"/>
+            <a:ext cx="7434024" cy="3884277"/>
+            <a:chOff x="4630592" y="2161415"/>
+            <a:chExt cx="7434024" cy="3884277"/>
+          </a:xfrm>
+        </p:grpSpPr>
+        <p:grpSp>
+          <p:nvGrpSpPr>
+            <p:cNvPr id="7" name="Group 6">
+              <a:extLst>
+                <a:ext uri="{FF2B5EF4-FFF2-40B4-BE49-F238E27FC236}">
+                  <a16:creationId xmlns:a16="http://schemas.microsoft.com/office/drawing/2014/main" id="{9840CA3C-FB7A-2CB0-DD8A-866C1715ED45}"/>
+                </a:ext>
+              </a:extLst>
+            </p:cNvPr>
+            <p:cNvGrpSpPr/>
+            <p:nvPr/>
+          </p:nvGrpSpPr>
+          <p:grpSpPr>
+            <a:xfrm>
+              <a:off x="4630592" y="2161415"/>
+              <a:ext cx="7434024" cy="3884277"/>
+              <a:chOff x="4630592" y="2161415"/>
+              <a:chExt cx="7434024" cy="3884277"/>
+            </a:xfrm>
+          </p:grpSpPr>
+          <p:pic>
+            <p:nvPicPr>
+              <p:cNvPr id="5" name="Picture 4">
+                <a:extLst>
+                  <a:ext uri="{FF2B5EF4-FFF2-40B4-BE49-F238E27FC236}">
+                    <a16:creationId xmlns:a16="http://schemas.microsoft.com/office/drawing/2014/main" id="{6D0C4F10-4933-7BA8-3DBB-19A4ABAC547F}"/>
+                  </a:ext>
+                </a:extLst>
+              </p:cNvPr>
+              <p:cNvPicPr>
+                <a:picLocks noChangeAspect="1"/>
+              </p:cNvPicPr>
+              <p:nvPr/>
+            </p:nvPicPr>
+            <p:blipFill>
+              <a:blip r:embed="rId2">
+                <a:extLst>
+                  <a:ext uri="{28A0092B-C50C-407E-A947-70E740481C1C}">
+                    <a14:useLocalDpi xmlns:a14="http://schemas.microsoft.com/office/drawing/2010/main" val="0"/>
+                  </a:ext>
+                </a:extLst>
+              </a:blip>
+              <a:stretch>
+                <a:fillRect/>
+              </a:stretch>
+            </p:blipFill>
+            <p:spPr>
+              <a:xfrm>
+                <a:off x="4630592" y="2161415"/>
+                <a:ext cx="7434024" cy="3884277"/>
+              </a:xfrm>
+              <a:prstGeom prst="rect">
+                <a:avLst/>
+              </a:prstGeom>
+            </p:spPr>
+          </p:pic>
+          <p:cxnSp>
+            <p:nvCxnSpPr>
+              <p:cNvPr id="6" name="Straight Connector 5">
+                <a:extLst>
+                  <a:ext uri="{FF2B5EF4-FFF2-40B4-BE49-F238E27FC236}">
+                    <a16:creationId xmlns:a16="http://schemas.microsoft.com/office/drawing/2014/main" id="{DED4241A-F336-FA73-64E1-6EA71AE4AD96}"/>
+                  </a:ext>
+                </a:extLst>
+              </p:cNvPr>
+              <p:cNvCxnSpPr/>
+              <p:nvPr/>
+            </p:nvCxnSpPr>
+            <p:spPr>
+              <a:xfrm>
+                <a:off x="7910004" y="6045692"/>
+                <a:ext cx="1020932" cy="0"/>
+              </a:xfrm>
+              <a:prstGeom prst="line">
+                <a:avLst/>
+              </a:prstGeom>
+            </p:spPr>
+            <p:style>
+              <a:lnRef idx="1">
+                <a:schemeClr val="dk1"/>
+              </a:lnRef>
+              <a:fillRef idx="0">
+                <a:schemeClr val="dk1"/>
+              </a:fillRef>
+              <a:effectRef idx="0">
+                <a:schemeClr val="dk1"/>
+              </a:effectRef>
+              <a:fontRef idx="minor">
+                <a:schemeClr val="tx1"/>
+              </a:fontRef>
+            </p:style>
+          </p:cxnSp>
+        </p:grpSp>
+        <p:cxnSp>
+          <p:nvCxnSpPr>
+            <p:cNvPr id="9" name="Straight Connector 8">
+              <a:extLst>
+                <a:ext uri="{FF2B5EF4-FFF2-40B4-BE49-F238E27FC236}">
+                  <a16:creationId xmlns:a16="http://schemas.microsoft.com/office/drawing/2014/main" id="{0DA1B4A0-9370-5872-AD02-F90A41AED1E1}"/>
+                </a:ext>
+              </a:extLst>
+            </p:cNvPr>
+            <p:cNvCxnSpPr/>
+            <p:nvPr/>
+          </p:nvCxnSpPr>
+          <p:spPr>
+            <a:xfrm>
+              <a:off x="10715348" y="6045692"/>
+              <a:ext cx="1029809" cy="0"/>
+            </a:xfrm>
+            <a:prstGeom prst="line">
+              <a:avLst/>
+            </a:prstGeom>
+          </p:spPr>
+          <p:style>
+            <a:lnRef idx="1">
+              <a:schemeClr val="dk1"/>
+            </a:lnRef>
+            <a:fillRef idx="0">
+              <a:schemeClr val="dk1"/>
+            </a:fillRef>
+            <a:effectRef idx="0">
+              <a:schemeClr val="dk1"/>
+            </a:effectRef>
+            <a:fontRef idx="minor">
+              <a:schemeClr val="tx1"/>
+            </a:fontRef>
+          </p:style>
+        </p:cxnSp>
+      </p:grpSp>
+    </p:spTree>
+    <p:extLst>
+      <p:ext uri="{BB962C8B-B14F-4D97-AF65-F5344CB8AC3E}">
+        <p14:creationId xmlns:p14="http://schemas.microsoft.com/office/powerpoint/2010/main" val="922834209"/>
+      </p:ext>
+    </p:extLst>
+  </p:cSld>
+  <p:clrMapOvr>
+    <a:masterClrMapping/>
+  </p:clrMapOvr>
+</p:sld>
+</file>
+
+<file path=ppt/slides/slide5.xml><?xml version="1.0" encoding="utf-8"?>
+<p:sld xmlns:a="http://schemas.openxmlformats.org/drawingml/2006/main" xmlns:r="http://schemas.openxmlformats.org/officeDocument/2006/relationships" xmlns:p="http://schemas.openxmlformats.org/presentationml/2006/main">
+  <p:cSld>
+    <p:spTree>
+      <p:nvGrpSpPr>
+        <p:cNvPr id="1" name=""/>
+        <p:cNvGrpSpPr/>
+        <p:nvPr/>
+      </p:nvGrpSpPr>
+      <p:grpSpPr>
+        <a:xfrm>
+          <a:off x="0" y="0"/>
+          <a:ext cx="0" cy="0"/>
+          <a:chOff x="0" y="0"/>
+          <a:chExt cx="0" cy="0"/>
+        </a:xfrm>
+      </p:grpSpPr>
+      <p:sp>
+        <p:nvSpPr>
+          <p:cNvPr id="2" name="Title 1">
+            <a:extLst>
+              <a:ext uri="{FF2B5EF4-FFF2-40B4-BE49-F238E27FC236}">
+                <a16:creationId xmlns:a16="http://schemas.microsoft.com/office/drawing/2014/main" id="{0C574733-EB3B-994F-70BB-809FB0915971}"/>
+              </a:ext>
+            </a:extLst>
+          </p:cNvPr>
+          <p:cNvSpPr>
+            <a:spLocks noGrp="1"/>
+          </p:cNvSpPr>
+          <p:nvPr>
+            <p:ph type="title"/>
+          </p:nvPr>
+        </p:nvSpPr>
+        <p:spPr/>
+        <p:txBody>
+          <a:bodyPr/>
+          <a:lstStyle/>
+          <a:p>
+            <a:r>
+              <a:rPr lang="en-US" dirty="0" err="1"/>
+              <a:t>Mikrofrontendi</a:t>
+            </a:r>
+            <a:r>
+              <a:rPr lang="en-US" dirty="0"/>
+              <a:t> </a:t>
+            </a:r>
+            <a:r>
+              <a:rPr lang="en-US" dirty="0" err="1"/>
+              <a:t>Eprodavnice</a:t>
+            </a:r>
+            <a:endParaRPr lang="sr-Latn-RS" dirty="0"/>
+          </a:p>
+        </p:txBody>
+      </p:sp>
+      <p:sp>
+        <p:nvSpPr>
+          <p:cNvPr id="3" name="Content Placeholder 2">
+            <a:extLst>
+              <a:ext uri="{FF2B5EF4-FFF2-40B4-BE49-F238E27FC236}">
+                <a16:creationId xmlns:a16="http://schemas.microsoft.com/office/drawing/2014/main" id="{EDA263EB-C689-B133-035D-89B543CE1ABE}"/>
+              </a:ext>
+            </a:extLst>
+          </p:cNvPr>
+          <p:cNvSpPr>
+            <a:spLocks noGrp="1"/>
+          </p:cNvSpPr>
+          <p:nvPr>
+            <p:ph idx="1"/>
+          </p:nvPr>
+        </p:nvSpPr>
+        <p:spPr/>
+        <p:txBody>
+          <a:bodyPr/>
+          <a:lstStyle/>
+          <a:p>
+            <a:r>
+              <a:rPr lang="sr-Latn-RS" sz="1800" i="1" dirty="0" err="1">
+                <a:effectLst/>
+                <a:latin typeface="Calibri Light" panose="020F0302020204030204" pitchFamily="34" charset="0"/>
+                <a:ea typeface="Calibri" panose="020F0502020204030204" pitchFamily="34" charset="0"/>
+                <a:cs typeface="Times New Roman" panose="02020603050405020304" pitchFamily="18" charset="0"/>
+              </a:rPr>
+              <a:t>Dashboard</a:t>
+            </a:r>
+            <a:r>
+              <a:rPr lang="sr-Latn-RS" sz="1800" i="1" dirty="0">
+                <a:effectLst/>
+                <a:latin typeface="Calibri Light" panose="020F0302020204030204" pitchFamily="34" charset="0"/>
+                <a:ea typeface="Calibri" panose="020F0502020204030204" pitchFamily="34" charset="0"/>
+                <a:cs typeface="Times New Roman" panose="02020603050405020304" pitchFamily="18" charset="0"/>
+              </a:rPr>
+              <a:t> </a:t>
+            </a:r>
+            <a:r>
+              <a:rPr lang="sr-Latn-RS" sz="1800" i="1" dirty="0" err="1">
+                <a:effectLst/>
+                <a:latin typeface="Calibri Light" panose="020F0302020204030204" pitchFamily="34" charset="0"/>
+                <a:ea typeface="Calibri" panose="020F0502020204030204" pitchFamily="34" charset="0"/>
+                <a:cs typeface="Times New Roman" panose="02020603050405020304" pitchFamily="18" charset="0"/>
+              </a:rPr>
+              <a:t>Mikrofrontend</a:t>
+            </a:r>
+            <a:r>
+              <a:rPr lang="en-US" sz="1800" i="1" dirty="0">
+                <a:effectLst/>
+                <a:latin typeface="Calibri Light" panose="020F0302020204030204" pitchFamily="34" charset="0"/>
+                <a:ea typeface="Calibri" panose="020F0502020204030204" pitchFamily="34" charset="0"/>
+                <a:cs typeface="Times New Roman" panose="02020603050405020304" pitchFamily="18" charset="0"/>
+              </a:rPr>
+              <a:t>, </a:t>
+            </a:r>
+            <a:r>
+              <a:rPr lang="sr-Latn-RS" sz="1800" i="1" dirty="0" err="1">
+                <a:effectLst/>
+                <a:latin typeface="Calibri Light" panose="020F0302020204030204" pitchFamily="34" charset="0"/>
+                <a:ea typeface="Calibri" panose="020F0502020204030204" pitchFamily="34" charset="0"/>
+                <a:cs typeface="Times New Roman" panose="02020603050405020304" pitchFamily="18" charset="0"/>
+              </a:rPr>
+              <a:t>Authentication</a:t>
+            </a:r>
+            <a:r>
+              <a:rPr lang="sr-Latn-RS" sz="1800" i="1" dirty="0">
+                <a:effectLst/>
+                <a:latin typeface="Calibri Light" panose="020F0302020204030204" pitchFamily="34" charset="0"/>
+                <a:ea typeface="Calibri" panose="020F0502020204030204" pitchFamily="34" charset="0"/>
+                <a:cs typeface="Times New Roman" panose="02020603050405020304" pitchFamily="18" charset="0"/>
+              </a:rPr>
+              <a:t> </a:t>
+            </a:r>
+            <a:r>
+              <a:rPr lang="sr-Latn-RS" sz="1800" i="1" dirty="0" err="1">
+                <a:effectLst/>
+                <a:latin typeface="Calibri Light" panose="020F0302020204030204" pitchFamily="34" charset="0"/>
+                <a:ea typeface="Calibri" panose="020F0502020204030204" pitchFamily="34" charset="0"/>
+                <a:cs typeface="Times New Roman" panose="02020603050405020304" pitchFamily="18" charset="0"/>
+              </a:rPr>
+              <a:t>Mikrofrontend</a:t>
+            </a:r>
+            <a:endParaRPr lang="sr-Latn-RS" dirty="0"/>
+          </a:p>
+        </p:txBody>
+      </p:sp>
       <p:pic>
         <p:nvPicPr>
           <p:cNvPr id="5" name="Picture 4">
             <a:extLst>
               <a:ext uri="{FF2B5EF4-FFF2-40B4-BE49-F238E27FC236}">
-                <a16:creationId xmlns:a16="http://schemas.microsoft.com/office/drawing/2014/main" id="{6D0C4F10-4933-7BA8-3DBB-19A4ABAC547F}"/>
+                <a16:creationId xmlns:a16="http://schemas.microsoft.com/office/drawing/2014/main" id="{AEFC6657-B7E6-5487-045B-2A0C1451003E}"/>
+              </a:ext>
+            </a:extLst>
+          </p:cNvPr>
+          <p:cNvPicPr>
+            <a:picLocks noChangeAspect="1"/>
+          </p:cNvPicPr>
+          <p:nvPr/>
+        </p:nvPicPr>
+        <p:blipFill rotWithShape="1">
+          <a:blip r:embed="rId2">
+            <a:extLst>
+              <a:ext uri="{28A0092B-C50C-407E-A947-70E740481C1C}">
+                <a14:useLocalDpi xmlns:a14="http://schemas.microsoft.com/office/drawing/2010/main" val="0"/>
+              </a:ext>
+            </a:extLst>
+          </a:blip>
+          <a:srcRect t="8034" r="1050" b="10485"/>
+          <a:stretch/>
+        </p:blipFill>
+        <p:spPr>
+          <a:xfrm>
+            <a:off x="1561693" y="2202162"/>
+            <a:ext cx="9068614" cy="4044925"/>
+          </a:xfrm>
+          <a:prstGeom prst="rect">
+            <a:avLst/>
+          </a:prstGeom>
+          <a:ln>
+            <a:noFill/>
+          </a:ln>
+          <a:effectLst>
+            <a:outerShdw blurRad="292100" dist="139700" dir="2700000" algn="tl" rotWithShape="0">
+              <a:srgbClr val="333333">
+                <a:alpha val="65000"/>
+              </a:srgbClr>
+            </a:outerShdw>
+          </a:effectLst>
+        </p:spPr>
+      </p:pic>
+    </p:spTree>
+    <p:extLst>
+      <p:ext uri="{BB962C8B-B14F-4D97-AF65-F5344CB8AC3E}">
+        <p14:creationId xmlns:p14="http://schemas.microsoft.com/office/powerpoint/2010/main" val="430651944"/>
+      </p:ext>
+    </p:extLst>
+  </p:cSld>
+  <p:clrMapOvr>
+    <a:masterClrMapping/>
+  </p:clrMapOvr>
+</p:sld>
+</file>
+
+<file path=ppt/slides/slide6.xml><?xml version="1.0" encoding="utf-8"?>
+<p:sld xmlns:a="http://schemas.openxmlformats.org/drawingml/2006/main" xmlns:r="http://schemas.openxmlformats.org/officeDocument/2006/relationships" xmlns:p="http://schemas.openxmlformats.org/presentationml/2006/main">
+  <p:cSld>
+    <p:spTree>
+      <p:nvGrpSpPr>
+        <p:cNvPr id="1" name=""/>
+        <p:cNvGrpSpPr/>
+        <p:nvPr/>
+      </p:nvGrpSpPr>
+      <p:grpSpPr>
+        <a:xfrm>
+          <a:off x="0" y="0"/>
+          <a:ext cx="0" cy="0"/>
+          <a:chOff x="0" y="0"/>
+          <a:chExt cx="0" cy="0"/>
+        </a:xfrm>
+      </p:grpSpPr>
+      <p:sp>
+        <p:nvSpPr>
+          <p:cNvPr id="2" name="Title 1">
+            <a:extLst>
+              <a:ext uri="{FF2B5EF4-FFF2-40B4-BE49-F238E27FC236}">
+                <a16:creationId xmlns:a16="http://schemas.microsoft.com/office/drawing/2014/main" id="{09628DF8-A9C2-A2C2-43C7-66A1DB2DBFAE}"/>
+              </a:ext>
+            </a:extLst>
+          </p:cNvPr>
+          <p:cNvSpPr>
+            <a:spLocks noGrp="1"/>
+          </p:cNvSpPr>
+          <p:nvPr>
+            <p:ph type="title"/>
+          </p:nvPr>
+        </p:nvSpPr>
+        <p:spPr>
+          <a:xfrm>
+            <a:off x="1066800" y="324379"/>
+            <a:ext cx="10058400" cy="748454"/>
+          </a:xfrm>
+        </p:spPr>
+        <p:txBody>
+          <a:bodyPr/>
+          <a:lstStyle/>
+          <a:p>
+            <a:r>
+              <a:rPr lang="en-US" dirty="0" err="1"/>
+              <a:t>Mikrofrontendi</a:t>
+            </a:r>
+            <a:r>
+              <a:rPr lang="en-US" dirty="0"/>
+              <a:t> </a:t>
+            </a:r>
+            <a:r>
+              <a:rPr lang="en-US" dirty="0" err="1"/>
+              <a:t>Eprodavnice</a:t>
+            </a:r>
+            <a:endParaRPr lang="sr-Latn-RS" dirty="0"/>
+          </a:p>
+        </p:txBody>
+      </p:sp>
+      <p:sp>
+        <p:nvSpPr>
+          <p:cNvPr id="3" name="Content Placeholder 2">
+            <a:extLst>
+              <a:ext uri="{FF2B5EF4-FFF2-40B4-BE49-F238E27FC236}">
+                <a16:creationId xmlns:a16="http://schemas.microsoft.com/office/drawing/2014/main" id="{4B7D6FC3-B761-56F5-1A1F-414F86982679}"/>
+              </a:ext>
+            </a:extLst>
+          </p:cNvPr>
+          <p:cNvSpPr>
+            <a:spLocks noGrp="1"/>
+          </p:cNvSpPr>
+          <p:nvPr>
+            <p:ph idx="1"/>
+          </p:nvPr>
+        </p:nvSpPr>
+        <p:spPr>
+          <a:xfrm>
+            <a:off x="1097280" y="1123025"/>
+            <a:ext cx="10058400" cy="4023360"/>
+          </a:xfrm>
+        </p:spPr>
+        <p:txBody>
+          <a:bodyPr/>
+          <a:lstStyle/>
+          <a:p>
+            <a:r>
+              <a:rPr lang="sr-Latn-RS" sz="1800" i="1" dirty="0" err="1">
+                <a:effectLst/>
+                <a:latin typeface="Calibri Light" panose="020F0302020204030204" pitchFamily="34" charset="0"/>
+                <a:ea typeface="Calibri" panose="020F0502020204030204" pitchFamily="34" charset="0"/>
+                <a:cs typeface="Times New Roman" panose="02020603050405020304" pitchFamily="18" charset="0"/>
+              </a:rPr>
+              <a:t>Product</a:t>
+            </a:r>
+            <a:r>
+              <a:rPr lang="sr-Latn-RS" sz="1800" i="1" dirty="0">
+                <a:effectLst/>
+                <a:latin typeface="Calibri Light" panose="020F0302020204030204" pitchFamily="34" charset="0"/>
+                <a:ea typeface="Calibri" panose="020F0502020204030204" pitchFamily="34" charset="0"/>
+                <a:cs typeface="Times New Roman" panose="02020603050405020304" pitchFamily="18" charset="0"/>
+              </a:rPr>
+              <a:t> Management </a:t>
+            </a:r>
+            <a:r>
+              <a:rPr lang="sr-Latn-RS" sz="1800" i="1" dirty="0" err="1">
+                <a:effectLst/>
+                <a:latin typeface="Calibri Light" panose="020F0302020204030204" pitchFamily="34" charset="0"/>
+                <a:ea typeface="Calibri" panose="020F0502020204030204" pitchFamily="34" charset="0"/>
+                <a:cs typeface="Times New Roman" panose="02020603050405020304" pitchFamily="18" charset="0"/>
+              </a:rPr>
+              <a:t>Mikrofrontend</a:t>
+            </a:r>
+            <a:endParaRPr lang="sr-Latn-RS" dirty="0"/>
+          </a:p>
+        </p:txBody>
+      </p:sp>
+      <p:pic>
+        <p:nvPicPr>
+          <p:cNvPr id="5" name="Picture 4">
+            <a:extLst>
+              <a:ext uri="{FF2B5EF4-FFF2-40B4-BE49-F238E27FC236}">
+                <a16:creationId xmlns:a16="http://schemas.microsoft.com/office/drawing/2014/main" id="{8839D8FE-9502-4336-D7AC-AB6CD5FCFAC3}"/>
+              </a:ext>
+            </a:extLst>
+          </p:cNvPr>
+          <p:cNvPicPr>
+            <a:picLocks noChangeAspect="1"/>
+          </p:cNvPicPr>
+          <p:nvPr/>
+        </p:nvPicPr>
+        <p:blipFill rotWithShape="1">
+          <a:blip r:embed="rId2">
+            <a:extLst>
+              <a:ext uri="{28A0092B-C50C-407E-A947-70E740481C1C}">
+                <a14:useLocalDpi xmlns:a14="http://schemas.microsoft.com/office/drawing/2010/main" val="0"/>
+              </a:ext>
+            </a:extLst>
+          </a:blip>
+          <a:srcRect t="7985" r="1396" b="7946"/>
+          <a:stretch/>
+        </p:blipFill>
+        <p:spPr>
+          <a:xfrm>
+            <a:off x="1196593" y="1535837"/>
+            <a:ext cx="4594369" cy="2121763"/>
+          </a:xfrm>
+          <a:prstGeom prst="rect">
+            <a:avLst/>
+          </a:prstGeom>
+          <a:ln>
+            <a:noFill/>
+          </a:ln>
+          <a:effectLst>
+            <a:outerShdw blurRad="292100" dist="139700" dir="2700000" algn="tl" rotWithShape="0">
+              <a:srgbClr val="333333">
+                <a:alpha val="65000"/>
+              </a:srgbClr>
+            </a:outerShdw>
+          </a:effectLst>
+        </p:spPr>
+      </p:pic>
+      <p:pic>
+        <p:nvPicPr>
+          <p:cNvPr id="7" name="Picture 6">
+            <a:extLst>
+              <a:ext uri="{FF2B5EF4-FFF2-40B4-BE49-F238E27FC236}">
+                <a16:creationId xmlns:a16="http://schemas.microsoft.com/office/drawing/2014/main" id="{C403B9F5-E45E-D2CD-52E1-5C72A91DCCA1}"/>
+              </a:ext>
+            </a:extLst>
+          </p:cNvPr>
+          <p:cNvPicPr>
+            <a:picLocks noChangeAspect="1"/>
+          </p:cNvPicPr>
+          <p:nvPr/>
+        </p:nvPicPr>
+        <p:blipFill rotWithShape="1">
+          <a:blip r:embed="rId3">
+            <a:extLst>
+              <a:ext uri="{28A0092B-C50C-407E-A947-70E740481C1C}">
+                <a14:useLocalDpi xmlns:a14="http://schemas.microsoft.com/office/drawing/2010/main" val="0"/>
+              </a:ext>
+            </a:extLst>
+          </a:blip>
+          <a:srcRect t="8530" b="22028"/>
+          <a:stretch/>
+        </p:blipFill>
+        <p:spPr>
+          <a:xfrm>
+            <a:off x="5874297" y="1535837"/>
+            <a:ext cx="5829670" cy="2192785"/>
+          </a:xfrm>
+          <a:prstGeom prst="rect">
+            <a:avLst/>
+          </a:prstGeom>
+          <a:ln>
+            <a:noFill/>
+          </a:ln>
+          <a:effectLst>
+            <a:outerShdw blurRad="292100" dist="139700" dir="2700000" algn="tl" rotWithShape="0">
+              <a:srgbClr val="333333">
+                <a:alpha val="65000"/>
+              </a:srgbClr>
+            </a:outerShdw>
+          </a:effectLst>
+        </p:spPr>
+      </p:pic>
+      <p:pic>
+        <p:nvPicPr>
+          <p:cNvPr id="9" name="Picture 8">
+            <a:extLst>
+              <a:ext uri="{FF2B5EF4-FFF2-40B4-BE49-F238E27FC236}">
+                <a16:creationId xmlns:a16="http://schemas.microsoft.com/office/drawing/2014/main" id="{6331250B-86DA-C917-727A-83C061EDF869}"/>
+              </a:ext>
+            </a:extLst>
+          </p:cNvPr>
+          <p:cNvPicPr>
+            <a:picLocks noChangeAspect="1"/>
+          </p:cNvPicPr>
+          <p:nvPr/>
+        </p:nvPicPr>
+        <p:blipFill rotWithShape="1">
+          <a:blip r:embed="rId4">
+            <a:extLst>
+              <a:ext uri="{28A0092B-C50C-407E-A947-70E740481C1C}">
+                <a14:useLocalDpi xmlns:a14="http://schemas.microsoft.com/office/drawing/2010/main" val="0"/>
+              </a:ext>
+            </a:extLst>
+          </a:blip>
+          <a:srcRect t="7966" r="918"/>
+          <a:stretch/>
+        </p:blipFill>
+        <p:spPr>
+          <a:xfrm>
+            <a:off x="1196593" y="3906176"/>
+            <a:ext cx="4677704" cy="2353522"/>
+          </a:xfrm>
+          <a:prstGeom prst="rect">
+            <a:avLst/>
+          </a:prstGeom>
+          <a:ln>
+            <a:noFill/>
+          </a:ln>
+          <a:effectLst>
+            <a:outerShdw blurRad="292100" dist="139700" dir="2700000" algn="tl" rotWithShape="0">
+              <a:srgbClr val="333333">
+                <a:alpha val="65000"/>
+              </a:srgbClr>
+            </a:outerShdw>
+          </a:effectLst>
+        </p:spPr>
+      </p:pic>
+      <p:pic>
+        <p:nvPicPr>
+          <p:cNvPr id="11" name="Picture 10">
+            <a:extLst>
+              <a:ext uri="{FF2B5EF4-FFF2-40B4-BE49-F238E27FC236}">
+                <a16:creationId xmlns:a16="http://schemas.microsoft.com/office/drawing/2014/main" id="{AEA3C447-F97E-EB59-2670-5861E54D99C0}"/>
               </a:ext>
             </a:extLst>
           </p:cNvPr>
@@ -4540,7 +5693,7 @@
           <p:nvPr/>
         </p:nvPicPr>
         <p:blipFill>
-          <a:blip r:embed="rId2">
+          <a:blip r:embed="rId5">
             <a:extLst>
               <a:ext uri="{28A0092B-C50C-407E-A947-70E740481C1C}">
                 <a14:useLocalDpi xmlns:a14="http://schemas.microsoft.com/office/drawing/2010/main" val="0"/>
@@ -4553,18 +5706,828 @@
         </p:blipFill>
         <p:spPr>
           <a:xfrm>
-            <a:off x="4630592" y="2161415"/>
-            <a:ext cx="7434024" cy="3884277"/>
+            <a:off x="7355133" y="3997119"/>
+            <a:ext cx="3244804" cy="1562078"/>
           </a:xfrm>
           <a:prstGeom prst="rect">
             <a:avLst/>
           </a:prstGeom>
+          <a:ln>
+            <a:noFill/>
+          </a:ln>
+          <a:effectLst>
+            <a:outerShdw blurRad="292100" dist="139700" dir="2700000" algn="tl" rotWithShape="0">
+              <a:srgbClr val="333333">
+                <a:alpha val="65000"/>
+              </a:srgbClr>
+            </a:outerShdw>
+          </a:effectLst>
         </p:spPr>
       </p:pic>
     </p:spTree>
     <p:extLst>
       <p:ext uri="{BB962C8B-B14F-4D97-AF65-F5344CB8AC3E}">
-        <p14:creationId xmlns:p14="http://schemas.microsoft.com/office/powerpoint/2010/main" val="922834209"/>
+        <p14:creationId xmlns:p14="http://schemas.microsoft.com/office/powerpoint/2010/main" val="3898154766"/>
+      </p:ext>
+    </p:extLst>
+  </p:cSld>
+  <p:clrMapOvr>
+    <a:masterClrMapping/>
+  </p:clrMapOvr>
+</p:sld>
+</file>
+
+<file path=ppt/slides/slide7.xml><?xml version="1.0" encoding="utf-8"?>
+<p:sld xmlns:a="http://schemas.openxmlformats.org/drawingml/2006/main" xmlns:r="http://schemas.openxmlformats.org/officeDocument/2006/relationships" xmlns:p="http://schemas.openxmlformats.org/presentationml/2006/main">
+  <p:cSld>
+    <p:spTree>
+      <p:nvGrpSpPr>
+        <p:cNvPr id="1" name=""/>
+        <p:cNvGrpSpPr/>
+        <p:nvPr/>
+      </p:nvGrpSpPr>
+      <p:grpSpPr>
+        <a:xfrm>
+          <a:off x="0" y="0"/>
+          <a:ext cx="0" cy="0"/>
+          <a:chOff x="0" y="0"/>
+          <a:chExt cx="0" cy="0"/>
+        </a:xfrm>
+      </p:grpSpPr>
+      <p:sp>
+        <p:nvSpPr>
+          <p:cNvPr id="2" name="Title 1">
+            <a:extLst>
+              <a:ext uri="{FF2B5EF4-FFF2-40B4-BE49-F238E27FC236}">
+                <a16:creationId xmlns:a16="http://schemas.microsoft.com/office/drawing/2014/main" id="{A8C5ECE3-7989-6D86-5086-C77791C3077C}"/>
+              </a:ext>
+            </a:extLst>
+          </p:cNvPr>
+          <p:cNvSpPr>
+            <a:spLocks noGrp="1"/>
+          </p:cNvSpPr>
+          <p:nvPr>
+            <p:ph type="title"/>
+          </p:nvPr>
+        </p:nvSpPr>
+        <p:spPr>
+          <a:xfrm>
+            <a:off x="1097280" y="261692"/>
+            <a:ext cx="10058400" cy="748454"/>
+          </a:xfrm>
+        </p:spPr>
+        <p:txBody>
+          <a:bodyPr>
+            <a:normAutofit/>
+          </a:bodyPr>
+          <a:lstStyle/>
+          <a:p>
+            <a:r>
+              <a:rPr lang="en-US" dirty="0" err="1"/>
+              <a:t>Mikrofrontendi</a:t>
+            </a:r>
+            <a:r>
+              <a:rPr lang="en-US" dirty="0"/>
+              <a:t> </a:t>
+            </a:r>
+            <a:r>
+              <a:rPr lang="en-US" dirty="0" err="1"/>
+              <a:t>Eprodavnice</a:t>
+            </a:r>
+            <a:endParaRPr lang="sr-Latn-RS" dirty="0"/>
+          </a:p>
+        </p:txBody>
+      </p:sp>
+      <p:sp>
+        <p:nvSpPr>
+          <p:cNvPr id="3" name="Content Placeholder 2">
+            <a:extLst>
+              <a:ext uri="{FF2B5EF4-FFF2-40B4-BE49-F238E27FC236}">
+                <a16:creationId xmlns:a16="http://schemas.microsoft.com/office/drawing/2014/main" id="{A1E52754-4538-A9A7-118F-26F4DB8C4AFC}"/>
+              </a:ext>
+            </a:extLst>
+          </p:cNvPr>
+          <p:cNvSpPr>
+            <a:spLocks noGrp="1"/>
+          </p:cNvSpPr>
+          <p:nvPr>
+            <p:ph idx="1"/>
+          </p:nvPr>
+        </p:nvSpPr>
+        <p:spPr>
+          <a:xfrm>
+            <a:off x="1097280" y="1009844"/>
+            <a:ext cx="10058400" cy="4023360"/>
+          </a:xfrm>
+        </p:spPr>
+        <p:txBody>
+          <a:bodyPr/>
+          <a:lstStyle/>
+          <a:p>
+            <a:r>
+              <a:rPr lang="sr-Latn-RS" sz="1800" i="1" dirty="0" err="1">
+                <a:effectLst/>
+                <a:latin typeface="Calibri Light" panose="020F0302020204030204" pitchFamily="34" charset="0"/>
+                <a:ea typeface="Calibri" panose="020F0502020204030204" pitchFamily="34" charset="0"/>
+                <a:cs typeface="Times New Roman" panose="02020603050405020304" pitchFamily="18" charset="0"/>
+              </a:rPr>
+              <a:t>Category</a:t>
+            </a:r>
+            <a:r>
+              <a:rPr lang="sr-Latn-RS" sz="1800" i="1" dirty="0">
+                <a:effectLst/>
+                <a:latin typeface="Calibri Light" panose="020F0302020204030204" pitchFamily="34" charset="0"/>
+                <a:ea typeface="Calibri" panose="020F0502020204030204" pitchFamily="34" charset="0"/>
+                <a:cs typeface="Times New Roman" panose="02020603050405020304" pitchFamily="18" charset="0"/>
+              </a:rPr>
+              <a:t> Management </a:t>
+            </a:r>
+            <a:r>
+              <a:rPr lang="sr-Latn-RS" sz="1800" i="1" dirty="0" err="1">
+                <a:effectLst/>
+                <a:latin typeface="Calibri Light" panose="020F0302020204030204" pitchFamily="34" charset="0"/>
+                <a:ea typeface="Calibri" panose="020F0502020204030204" pitchFamily="34" charset="0"/>
+                <a:cs typeface="Times New Roman" panose="02020603050405020304" pitchFamily="18" charset="0"/>
+              </a:rPr>
+              <a:t>Mikrofrontend</a:t>
+            </a:r>
+            <a:r>
+              <a:rPr lang="sr-Latn-RS" sz="1800" i="1" dirty="0">
+                <a:effectLst/>
+                <a:latin typeface="Calibri Light" panose="020F0302020204030204" pitchFamily="34" charset="0"/>
+                <a:ea typeface="Calibri" panose="020F0502020204030204" pitchFamily="34" charset="0"/>
+                <a:cs typeface="Times New Roman" panose="02020603050405020304" pitchFamily="18" charset="0"/>
+              </a:rPr>
+              <a:t> </a:t>
+            </a:r>
+            <a:r>
+              <a:rPr lang="en-US" sz="1800" i="1" dirty="0">
+                <a:effectLst/>
+                <a:latin typeface="Calibri Light" panose="020F0302020204030204" pitchFamily="34" charset="0"/>
+                <a:ea typeface="Calibri" panose="020F0502020204030204" pitchFamily="34" charset="0"/>
+                <a:cs typeface="Times New Roman" panose="02020603050405020304" pitchFamily="18" charset="0"/>
+              </a:rPr>
+              <a:t>			</a:t>
+            </a:r>
+            <a:r>
+              <a:rPr lang="sr-Latn-RS" sz="1800" i="1" dirty="0" err="1">
+                <a:effectLst/>
+                <a:latin typeface="Calibri Light" panose="020F0302020204030204" pitchFamily="34" charset="0"/>
+                <a:ea typeface="Calibri" panose="020F0502020204030204" pitchFamily="34" charset="0"/>
+                <a:cs typeface="Times New Roman" panose="02020603050405020304" pitchFamily="18" charset="0"/>
+              </a:rPr>
+              <a:t>Bill</a:t>
+            </a:r>
+            <a:r>
+              <a:rPr lang="sr-Latn-RS" sz="1800" i="1" dirty="0">
+                <a:effectLst/>
+                <a:latin typeface="Calibri Light" panose="020F0302020204030204" pitchFamily="34" charset="0"/>
+                <a:ea typeface="Calibri" panose="020F0502020204030204" pitchFamily="34" charset="0"/>
+                <a:cs typeface="Times New Roman" panose="02020603050405020304" pitchFamily="18" charset="0"/>
+              </a:rPr>
+              <a:t> Management </a:t>
+            </a:r>
+            <a:r>
+              <a:rPr lang="sr-Latn-RS" sz="1800" i="1" dirty="0" err="1">
+                <a:effectLst/>
+                <a:latin typeface="Calibri Light" panose="020F0302020204030204" pitchFamily="34" charset="0"/>
+                <a:ea typeface="Calibri" panose="020F0502020204030204" pitchFamily="34" charset="0"/>
+                <a:cs typeface="Times New Roman" panose="02020603050405020304" pitchFamily="18" charset="0"/>
+              </a:rPr>
+              <a:t>Mikrofrontend</a:t>
+            </a:r>
+            <a:endParaRPr lang="sr-Latn-RS" dirty="0"/>
+          </a:p>
+        </p:txBody>
+      </p:sp>
+      <p:pic>
+        <p:nvPicPr>
+          <p:cNvPr id="5" name="Picture 4">
+            <a:extLst>
+              <a:ext uri="{FF2B5EF4-FFF2-40B4-BE49-F238E27FC236}">
+                <a16:creationId xmlns:a16="http://schemas.microsoft.com/office/drawing/2014/main" id="{73B0639A-7671-7333-19E2-6AC02F6CD60B}"/>
+              </a:ext>
+            </a:extLst>
+          </p:cNvPr>
+          <p:cNvPicPr>
+            <a:picLocks noChangeAspect="1"/>
+          </p:cNvPicPr>
+          <p:nvPr/>
+        </p:nvPicPr>
+        <p:blipFill rotWithShape="1">
+          <a:blip r:embed="rId2">
+            <a:extLst>
+              <a:ext uri="{28A0092B-C50C-407E-A947-70E740481C1C}">
+                <a14:useLocalDpi xmlns:a14="http://schemas.microsoft.com/office/drawing/2010/main" val="0"/>
+              </a:ext>
+            </a:extLst>
+          </a:blip>
+          <a:srcRect t="8633" r="1240" b="7410"/>
+          <a:stretch/>
+        </p:blipFill>
+        <p:spPr>
+          <a:xfrm>
+            <a:off x="576479" y="1455938"/>
+            <a:ext cx="5417428" cy="2494625"/>
+          </a:xfrm>
+          <a:prstGeom prst="rect">
+            <a:avLst/>
+          </a:prstGeom>
+          <a:ln>
+            <a:noFill/>
+          </a:ln>
+          <a:effectLst>
+            <a:outerShdw blurRad="292100" dist="139700" dir="2700000" algn="tl" rotWithShape="0">
+              <a:srgbClr val="333333">
+                <a:alpha val="65000"/>
+              </a:srgbClr>
+            </a:outerShdw>
+          </a:effectLst>
+        </p:spPr>
+      </p:pic>
+      <p:pic>
+        <p:nvPicPr>
+          <p:cNvPr id="7" name="Picture 6">
+            <a:extLst>
+              <a:ext uri="{FF2B5EF4-FFF2-40B4-BE49-F238E27FC236}">
+                <a16:creationId xmlns:a16="http://schemas.microsoft.com/office/drawing/2014/main" id="{1B66CDCF-A1D7-EB79-AE46-2E772880DA2A}"/>
+              </a:ext>
+            </a:extLst>
+          </p:cNvPr>
+          <p:cNvPicPr>
+            <a:picLocks noChangeAspect="1"/>
+          </p:cNvPicPr>
+          <p:nvPr/>
+        </p:nvPicPr>
+        <p:blipFill rotWithShape="1">
+          <a:blip r:embed="rId3">
+            <a:extLst>
+              <a:ext uri="{28A0092B-C50C-407E-A947-70E740481C1C}">
+                <a14:useLocalDpi xmlns:a14="http://schemas.microsoft.com/office/drawing/2010/main" val="0"/>
+              </a:ext>
+            </a:extLst>
+          </a:blip>
+          <a:srcRect t="8293" b="37533"/>
+          <a:stretch/>
+        </p:blipFill>
+        <p:spPr>
+          <a:xfrm>
+            <a:off x="6096000" y="1536539"/>
+            <a:ext cx="5417427" cy="1589725"/>
+          </a:xfrm>
+          <a:prstGeom prst="rect">
+            <a:avLst/>
+          </a:prstGeom>
+          <a:ln>
+            <a:noFill/>
+          </a:ln>
+          <a:effectLst>
+            <a:outerShdw blurRad="292100" dist="139700" dir="2700000" algn="tl" rotWithShape="0">
+              <a:srgbClr val="333333">
+                <a:alpha val="65000"/>
+              </a:srgbClr>
+            </a:outerShdw>
+          </a:effectLst>
+        </p:spPr>
+      </p:pic>
+      <p:pic>
+        <p:nvPicPr>
+          <p:cNvPr id="9" name="Picture 8">
+            <a:extLst>
+              <a:ext uri="{FF2B5EF4-FFF2-40B4-BE49-F238E27FC236}">
+                <a16:creationId xmlns:a16="http://schemas.microsoft.com/office/drawing/2014/main" id="{AE747885-DE53-3FFF-F6E6-7328B808EFF4}"/>
+              </a:ext>
+            </a:extLst>
+          </p:cNvPr>
+          <p:cNvPicPr>
+            <a:picLocks noChangeAspect="1"/>
+          </p:cNvPicPr>
+          <p:nvPr/>
+        </p:nvPicPr>
+        <p:blipFill rotWithShape="1">
+          <a:blip r:embed="rId4">
+            <a:extLst>
+              <a:ext uri="{28A0092B-C50C-407E-A947-70E740481C1C}">
+                <a14:useLocalDpi xmlns:a14="http://schemas.microsoft.com/office/drawing/2010/main" val="0"/>
+              </a:ext>
+            </a:extLst>
+          </a:blip>
+          <a:srcRect t="8294" r="970" b="14544"/>
+          <a:stretch/>
+        </p:blipFill>
+        <p:spPr>
+          <a:xfrm>
+            <a:off x="6096000" y="3335792"/>
+            <a:ext cx="5942121" cy="2507925"/>
+          </a:xfrm>
+          <a:prstGeom prst="rect">
+            <a:avLst/>
+          </a:prstGeom>
+          <a:ln>
+            <a:noFill/>
+          </a:ln>
+          <a:effectLst>
+            <a:outerShdw blurRad="292100" dist="139700" dir="2700000" algn="tl" rotWithShape="0">
+              <a:srgbClr val="333333">
+                <a:alpha val="65000"/>
+              </a:srgbClr>
+            </a:outerShdw>
+          </a:effectLst>
+        </p:spPr>
+      </p:pic>
+      <p:pic>
+        <p:nvPicPr>
+          <p:cNvPr id="11" name="Picture 10">
+            <a:extLst>
+              <a:ext uri="{FF2B5EF4-FFF2-40B4-BE49-F238E27FC236}">
+                <a16:creationId xmlns:a16="http://schemas.microsoft.com/office/drawing/2014/main" id="{76D6AFEB-33A6-8823-F7C7-499E12940A26}"/>
+              </a:ext>
+            </a:extLst>
+          </p:cNvPr>
+          <p:cNvPicPr>
+            <a:picLocks noChangeAspect="1"/>
+          </p:cNvPicPr>
+          <p:nvPr/>
+        </p:nvPicPr>
+        <p:blipFill>
+          <a:blip r:embed="rId5">
+            <a:extLst>
+              <a:ext uri="{28A0092B-C50C-407E-A947-70E740481C1C}">
+                <a14:useLocalDpi xmlns:a14="http://schemas.microsoft.com/office/drawing/2010/main" val="0"/>
+              </a:ext>
+            </a:extLst>
+          </a:blip>
+          <a:stretch>
+            <a:fillRect/>
+          </a:stretch>
+        </p:blipFill>
+        <p:spPr>
+          <a:xfrm>
+            <a:off x="1519686" y="4174235"/>
+            <a:ext cx="3274255" cy="1669482"/>
+          </a:xfrm>
+          <a:prstGeom prst="rect">
+            <a:avLst/>
+          </a:prstGeom>
+          <a:ln>
+            <a:noFill/>
+          </a:ln>
+          <a:effectLst>
+            <a:outerShdw blurRad="292100" dist="139700" dir="2700000" algn="tl" rotWithShape="0">
+              <a:srgbClr val="333333">
+                <a:alpha val="65000"/>
+              </a:srgbClr>
+            </a:outerShdw>
+          </a:effectLst>
+        </p:spPr>
+      </p:pic>
+    </p:spTree>
+    <p:extLst>
+      <p:ext uri="{BB962C8B-B14F-4D97-AF65-F5344CB8AC3E}">
+        <p14:creationId xmlns:p14="http://schemas.microsoft.com/office/powerpoint/2010/main" val="4203050483"/>
+      </p:ext>
+    </p:extLst>
+  </p:cSld>
+  <p:clrMapOvr>
+    <a:masterClrMapping/>
+  </p:clrMapOvr>
+</p:sld>
+</file>
+
+<file path=ppt/slides/slide8.xml><?xml version="1.0" encoding="utf-8"?>
+<p:sld xmlns:a="http://schemas.openxmlformats.org/drawingml/2006/main" xmlns:r="http://schemas.openxmlformats.org/officeDocument/2006/relationships" xmlns:p="http://schemas.openxmlformats.org/presentationml/2006/main">
+  <p:cSld>
+    <p:spTree>
+      <p:nvGrpSpPr>
+        <p:cNvPr id="1" name=""/>
+        <p:cNvGrpSpPr/>
+        <p:nvPr/>
+      </p:nvGrpSpPr>
+      <p:grpSpPr>
+        <a:xfrm>
+          <a:off x="0" y="0"/>
+          <a:ext cx="0" cy="0"/>
+          <a:chOff x="0" y="0"/>
+          <a:chExt cx="0" cy="0"/>
+        </a:xfrm>
+      </p:grpSpPr>
+      <p:sp>
+        <p:nvSpPr>
+          <p:cNvPr id="2" name="Title 1">
+            <a:extLst>
+              <a:ext uri="{FF2B5EF4-FFF2-40B4-BE49-F238E27FC236}">
+                <a16:creationId xmlns:a16="http://schemas.microsoft.com/office/drawing/2014/main" id="{44708541-C149-A370-D8ED-B5A9F87DE9F7}"/>
+              </a:ext>
+            </a:extLst>
+          </p:cNvPr>
+          <p:cNvSpPr>
+            <a:spLocks noGrp="1"/>
+          </p:cNvSpPr>
+          <p:nvPr>
+            <p:ph type="title"/>
+          </p:nvPr>
+        </p:nvSpPr>
+        <p:spPr>
+          <a:xfrm>
+            <a:off x="1097280" y="270570"/>
+            <a:ext cx="10058400" cy="748454"/>
+          </a:xfrm>
+        </p:spPr>
+        <p:txBody>
+          <a:bodyPr/>
+          <a:lstStyle/>
+          <a:p>
+            <a:r>
+              <a:rPr lang="en-US" dirty="0" err="1"/>
+              <a:t>Mikrofrontendi</a:t>
+            </a:r>
+            <a:r>
+              <a:rPr lang="en-US" dirty="0"/>
+              <a:t> </a:t>
+            </a:r>
+            <a:r>
+              <a:rPr lang="en-US" dirty="0" err="1"/>
+              <a:t>Eprodavnice</a:t>
+            </a:r>
+            <a:endParaRPr lang="sr-Latn-RS" dirty="0"/>
+          </a:p>
+        </p:txBody>
+      </p:sp>
+      <p:sp>
+        <p:nvSpPr>
+          <p:cNvPr id="3" name="Content Placeholder 2">
+            <a:extLst>
+              <a:ext uri="{FF2B5EF4-FFF2-40B4-BE49-F238E27FC236}">
+                <a16:creationId xmlns:a16="http://schemas.microsoft.com/office/drawing/2014/main" id="{41A05744-B89D-3200-4246-FBED983DEDC4}"/>
+              </a:ext>
+            </a:extLst>
+          </p:cNvPr>
+          <p:cNvSpPr>
+            <a:spLocks noGrp="1"/>
+          </p:cNvSpPr>
+          <p:nvPr>
+            <p:ph idx="1"/>
+          </p:nvPr>
+        </p:nvSpPr>
+        <p:spPr>
+          <a:xfrm>
+            <a:off x="1097280" y="1019024"/>
+            <a:ext cx="10058400" cy="4023360"/>
+          </a:xfrm>
+        </p:spPr>
+        <p:txBody>
+          <a:bodyPr/>
+          <a:lstStyle/>
+          <a:p>
+            <a:r>
+              <a:rPr lang="sr-Latn-RS" sz="1800" i="1" dirty="0" err="1">
+                <a:effectLst/>
+                <a:latin typeface="Calibri Light" panose="020F0302020204030204" pitchFamily="34" charset="0"/>
+                <a:ea typeface="Calibri" panose="020F0502020204030204" pitchFamily="34" charset="0"/>
+                <a:cs typeface="Times New Roman" panose="02020603050405020304" pitchFamily="18" charset="0"/>
+              </a:rPr>
+              <a:t>Review</a:t>
+            </a:r>
+            <a:r>
+              <a:rPr lang="sr-Latn-RS" sz="1800" i="1" dirty="0">
+                <a:effectLst/>
+                <a:latin typeface="Calibri Light" panose="020F0302020204030204" pitchFamily="34" charset="0"/>
+                <a:ea typeface="Calibri" panose="020F0502020204030204" pitchFamily="34" charset="0"/>
+                <a:cs typeface="Times New Roman" panose="02020603050405020304" pitchFamily="18" charset="0"/>
+              </a:rPr>
+              <a:t> Management </a:t>
+            </a:r>
+            <a:r>
+              <a:rPr lang="sr-Latn-RS" sz="1800" i="1" dirty="0" err="1">
+                <a:effectLst/>
+                <a:latin typeface="Calibri Light" panose="020F0302020204030204" pitchFamily="34" charset="0"/>
+                <a:ea typeface="Calibri" panose="020F0502020204030204" pitchFamily="34" charset="0"/>
+                <a:cs typeface="Times New Roman" panose="02020603050405020304" pitchFamily="18" charset="0"/>
+              </a:rPr>
+              <a:t>Mikrofrontend</a:t>
+            </a:r>
+            <a:r>
+              <a:rPr lang="sr-Latn-RS" sz="1800" i="1" dirty="0">
+                <a:effectLst/>
+                <a:latin typeface="Calibri Light" panose="020F0302020204030204" pitchFamily="34" charset="0"/>
+                <a:ea typeface="Calibri" panose="020F0502020204030204" pitchFamily="34" charset="0"/>
+                <a:cs typeface="Times New Roman" panose="02020603050405020304" pitchFamily="18" charset="0"/>
+              </a:rPr>
+              <a:t> </a:t>
+            </a:r>
+            <a:r>
+              <a:rPr lang="en-US" sz="1800" i="1" dirty="0">
+                <a:effectLst/>
+                <a:latin typeface="Calibri Light" panose="020F0302020204030204" pitchFamily="34" charset="0"/>
+                <a:ea typeface="Calibri" panose="020F0502020204030204" pitchFamily="34" charset="0"/>
+                <a:cs typeface="Times New Roman" panose="02020603050405020304" pitchFamily="18" charset="0"/>
+              </a:rPr>
+              <a:t>			</a:t>
+            </a:r>
+            <a:r>
+              <a:rPr lang="sr-Latn-RS" sz="1800" i="1" dirty="0" err="1">
+                <a:effectLst/>
+                <a:latin typeface="Calibri Light" panose="020F0302020204030204" pitchFamily="34" charset="0"/>
+                <a:ea typeface="Calibri" panose="020F0502020204030204" pitchFamily="34" charset="0"/>
+                <a:cs typeface="Times New Roman" panose="02020603050405020304" pitchFamily="18" charset="0"/>
+              </a:rPr>
+              <a:t>User</a:t>
+            </a:r>
+            <a:r>
+              <a:rPr lang="sr-Latn-RS" sz="1800" i="1" dirty="0">
+                <a:effectLst/>
+                <a:latin typeface="Calibri Light" panose="020F0302020204030204" pitchFamily="34" charset="0"/>
+                <a:ea typeface="Calibri" panose="020F0502020204030204" pitchFamily="34" charset="0"/>
+                <a:cs typeface="Times New Roman" panose="02020603050405020304" pitchFamily="18" charset="0"/>
+              </a:rPr>
+              <a:t> Management </a:t>
+            </a:r>
+            <a:r>
+              <a:rPr lang="sr-Latn-RS" sz="1800" i="1" dirty="0" err="1">
+                <a:effectLst/>
+                <a:latin typeface="Calibri Light" panose="020F0302020204030204" pitchFamily="34" charset="0"/>
+                <a:ea typeface="Calibri" panose="020F0502020204030204" pitchFamily="34" charset="0"/>
+                <a:cs typeface="Times New Roman" panose="02020603050405020304" pitchFamily="18" charset="0"/>
+              </a:rPr>
+              <a:t>Mikrofrontend</a:t>
+            </a:r>
+            <a:endParaRPr lang="sr-Latn-RS" dirty="0"/>
+          </a:p>
+        </p:txBody>
+      </p:sp>
+      <p:pic>
+        <p:nvPicPr>
+          <p:cNvPr id="5" name="Picture 4">
+            <a:extLst>
+              <a:ext uri="{FF2B5EF4-FFF2-40B4-BE49-F238E27FC236}">
+                <a16:creationId xmlns:a16="http://schemas.microsoft.com/office/drawing/2014/main" id="{00D4797C-0AD6-F076-2894-4A82C361F0E2}"/>
+              </a:ext>
+            </a:extLst>
+          </p:cNvPr>
+          <p:cNvPicPr>
+            <a:picLocks noChangeAspect="1"/>
+          </p:cNvPicPr>
+          <p:nvPr/>
+        </p:nvPicPr>
+        <p:blipFill rotWithShape="1">
+          <a:blip r:embed="rId2">
+            <a:extLst>
+              <a:ext uri="{28A0092B-C50C-407E-A947-70E740481C1C}">
+                <a14:useLocalDpi xmlns:a14="http://schemas.microsoft.com/office/drawing/2010/main" val="0"/>
+              </a:ext>
+            </a:extLst>
+          </a:blip>
+          <a:srcRect t="8159" r="1043" b="25570"/>
+          <a:stretch/>
+        </p:blipFill>
+        <p:spPr>
+          <a:xfrm>
+            <a:off x="146777" y="1404694"/>
+            <a:ext cx="5845649" cy="2120543"/>
+          </a:xfrm>
+          <a:prstGeom prst="rect">
+            <a:avLst/>
+          </a:prstGeom>
+          <a:ln>
+            <a:noFill/>
+          </a:ln>
+          <a:effectLst>
+            <a:outerShdw blurRad="292100" dist="139700" dir="2700000" algn="tl" rotWithShape="0">
+              <a:srgbClr val="333333">
+                <a:alpha val="65000"/>
+              </a:srgbClr>
+            </a:outerShdw>
+          </a:effectLst>
+        </p:spPr>
+      </p:pic>
+      <p:pic>
+        <p:nvPicPr>
+          <p:cNvPr id="7" name="Picture 6">
+            <a:extLst>
+              <a:ext uri="{FF2B5EF4-FFF2-40B4-BE49-F238E27FC236}">
+                <a16:creationId xmlns:a16="http://schemas.microsoft.com/office/drawing/2014/main" id="{C390476D-902A-5533-1676-5ADC0FF77FE5}"/>
+              </a:ext>
+            </a:extLst>
+          </p:cNvPr>
+          <p:cNvPicPr>
+            <a:picLocks noChangeAspect="1"/>
+          </p:cNvPicPr>
+          <p:nvPr/>
+        </p:nvPicPr>
+        <p:blipFill>
+          <a:blip r:embed="rId3">
+            <a:extLst>
+              <a:ext uri="{28A0092B-C50C-407E-A947-70E740481C1C}">
+                <a14:useLocalDpi xmlns:a14="http://schemas.microsoft.com/office/drawing/2010/main" val="0"/>
+              </a:ext>
+            </a:extLst>
+          </a:blip>
+          <a:stretch>
+            <a:fillRect/>
+          </a:stretch>
+        </p:blipFill>
+        <p:spPr>
+          <a:xfrm>
+            <a:off x="1729326" y="3873221"/>
+            <a:ext cx="3075311" cy="2309522"/>
+          </a:xfrm>
+          <a:prstGeom prst="rect">
+            <a:avLst/>
+          </a:prstGeom>
+          <a:ln>
+            <a:noFill/>
+          </a:ln>
+          <a:effectLst>
+            <a:outerShdw blurRad="292100" dist="139700" dir="2700000" algn="tl" rotWithShape="0">
+              <a:srgbClr val="333333">
+                <a:alpha val="65000"/>
+              </a:srgbClr>
+            </a:outerShdw>
+          </a:effectLst>
+        </p:spPr>
+      </p:pic>
+      <p:pic>
+        <p:nvPicPr>
+          <p:cNvPr id="9" name="Picture 8">
+            <a:extLst>
+              <a:ext uri="{FF2B5EF4-FFF2-40B4-BE49-F238E27FC236}">
+                <a16:creationId xmlns:a16="http://schemas.microsoft.com/office/drawing/2014/main" id="{AAED4A96-1F13-B762-7959-05DA3E09C27C}"/>
+              </a:ext>
+            </a:extLst>
+          </p:cNvPr>
+          <p:cNvPicPr>
+            <a:picLocks noChangeAspect="1"/>
+          </p:cNvPicPr>
+          <p:nvPr/>
+        </p:nvPicPr>
+        <p:blipFill rotWithShape="1">
+          <a:blip r:embed="rId4">
+            <a:extLst>
+              <a:ext uri="{28A0092B-C50C-407E-A947-70E740481C1C}">
+                <a14:useLocalDpi xmlns:a14="http://schemas.microsoft.com/office/drawing/2010/main" val="0"/>
+              </a:ext>
+            </a:extLst>
+          </a:blip>
+          <a:srcRect t="8083" r="825" b="54201"/>
+          <a:stretch/>
+        </p:blipFill>
+        <p:spPr>
+          <a:xfrm>
+            <a:off x="5436682" y="4321045"/>
+            <a:ext cx="6351043" cy="1308259"/>
+          </a:xfrm>
+          <a:prstGeom prst="rect">
+            <a:avLst/>
+          </a:prstGeom>
+          <a:ln>
+            <a:noFill/>
+          </a:ln>
+          <a:effectLst>
+            <a:outerShdw blurRad="292100" dist="139700" dir="2700000" algn="tl" rotWithShape="0">
+              <a:srgbClr val="333333">
+                <a:alpha val="65000"/>
+              </a:srgbClr>
+            </a:outerShdw>
+          </a:effectLst>
+        </p:spPr>
+      </p:pic>
+      <p:pic>
+        <p:nvPicPr>
+          <p:cNvPr id="11" name="Picture 10">
+            <a:extLst>
+              <a:ext uri="{FF2B5EF4-FFF2-40B4-BE49-F238E27FC236}">
+                <a16:creationId xmlns:a16="http://schemas.microsoft.com/office/drawing/2014/main" id="{60D4AD45-CA2B-970C-31E8-3B093EC07ADF}"/>
+              </a:ext>
+            </a:extLst>
+          </p:cNvPr>
+          <p:cNvPicPr>
+            <a:picLocks noChangeAspect="1"/>
+          </p:cNvPicPr>
+          <p:nvPr/>
+        </p:nvPicPr>
+        <p:blipFill rotWithShape="1">
+          <a:blip r:embed="rId5">
+            <a:extLst>
+              <a:ext uri="{28A0092B-C50C-407E-A947-70E740481C1C}">
+                <a14:useLocalDpi xmlns:a14="http://schemas.microsoft.com/office/drawing/2010/main" val="0"/>
+              </a:ext>
+            </a:extLst>
+          </a:blip>
+          <a:srcRect t="8084" r="1117" b="15755"/>
+          <a:stretch/>
+        </p:blipFill>
+        <p:spPr>
+          <a:xfrm>
+            <a:off x="6096000" y="1416306"/>
+            <a:ext cx="6010182" cy="2507457"/>
+          </a:xfrm>
+          <a:prstGeom prst="rect">
+            <a:avLst/>
+          </a:prstGeom>
+          <a:ln>
+            <a:noFill/>
+          </a:ln>
+          <a:effectLst>
+            <a:outerShdw blurRad="292100" dist="139700" dir="2700000" algn="tl" rotWithShape="0">
+              <a:srgbClr val="333333">
+                <a:alpha val="65000"/>
+              </a:srgbClr>
+            </a:outerShdw>
+          </a:effectLst>
+        </p:spPr>
+      </p:pic>
+    </p:spTree>
+    <p:extLst>
+      <p:ext uri="{BB962C8B-B14F-4D97-AF65-F5344CB8AC3E}">
+        <p14:creationId xmlns:p14="http://schemas.microsoft.com/office/powerpoint/2010/main" val="1003004137"/>
+      </p:ext>
+    </p:extLst>
+  </p:cSld>
+  <p:clrMapOvr>
+    <a:masterClrMapping/>
+  </p:clrMapOvr>
+</p:sld>
+</file>
+
+<file path=ppt/slides/slide9.xml><?xml version="1.0" encoding="utf-8"?>
+<p:sld xmlns:a="http://schemas.openxmlformats.org/drawingml/2006/main" xmlns:r="http://schemas.openxmlformats.org/officeDocument/2006/relationships" xmlns:p="http://schemas.openxmlformats.org/presentationml/2006/main">
+  <p:cSld>
+    <p:spTree>
+      <p:nvGrpSpPr>
+        <p:cNvPr id="1" name=""/>
+        <p:cNvGrpSpPr/>
+        <p:nvPr/>
+      </p:nvGrpSpPr>
+      <p:grpSpPr>
+        <a:xfrm>
+          <a:off x="0" y="0"/>
+          <a:ext cx="0" cy="0"/>
+          <a:chOff x="0" y="0"/>
+          <a:chExt cx="0" cy="0"/>
+        </a:xfrm>
+      </p:grpSpPr>
+      <p:sp>
+        <p:nvSpPr>
+          <p:cNvPr id="2" name="Title 1">
+            <a:extLst>
+              <a:ext uri="{FF2B5EF4-FFF2-40B4-BE49-F238E27FC236}">
+                <a16:creationId xmlns:a16="http://schemas.microsoft.com/office/drawing/2014/main" id="{56055B3C-3AA4-756D-DC90-1D02AD46167E}"/>
+              </a:ext>
+            </a:extLst>
+          </p:cNvPr>
+          <p:cNvSpPr>
+            <a:spLocks noGrp="1"/>
+          </p:cNvSpPr>
+          <p:nvPr>
+            <p:ph type="title"/>
+          </p:nvPr>
+        </p:nvSpPr>
+        <p:spPr/>
+        <p:txBody>
+          <a:bodyPr/>
+          <a:lstStyle/>
+          <a:p>
+            <a:r>
+              <a:rPr lang="en-US" dirty="0"/>
+              <a:t>Backend </a:t>
+            </a:r>
+            <a:r>
+              <a:rPr lang="en-US" dirty="0" err="1"/>
+              <a:t>Eprodavnice</a:t>
+            </a:r>
+            <a:endParaRPr lang="sr-Latn-RS" dirty="0"/>
+          </a:p>
+        </p:txBody>
+      </p:sp>
+      <p:sp>
+        <p:nvSpPr>
+          <p:cNvPr id="3" name="Content Placeholder 2">
+            <a:extLst>
+              <a:ext uri="{FF2B5EF4-FFF2-40B4-BE49-F238E27FC236}">
+                <a16:creationId xmlns:a16="http://schemas.microsoft.com/office/drawing/2014/main" id="{A1545E73-68CE-056C-DBAE-2E90D33242F8}"/>
+              </a:ext>
+            </a:extLst>
+          </p:cNvPr>
+          <p:cNvSpPr>
+            <a:spLocks noGrp="1"/>
+          </p:cNvSpPr>
+          <p:nvPr>
+            <p:ph idx="1"/>
+          </p:nvPr>
+        </p:nvSpPr>
+        <p:spPr/>
+        <p:txBody>
+          <a:bodyPr/>
+          <a:lstStyle/>
+          <a:p>
+            <a:endParaRPr lang="sr-Latn-RS"/>
+          </a:p>
+        </p:txBody>
+      </p:sp>
+    </p:spTree>
+    <p:extLst>
+      <p:ext uri="{BB962C8B-B14F-4D97-AF65-F5344CB8AC3E}">
+        <p14:creationId xmlns:p14="http://schemas.microsoft.com/office/powerpoint/2010/main" val="3633648669"/>
       </p:ext>
     </p:extLst>
   </p:cSld>
@@ -4855,4 +6818,299 @@
     </a:ext>
   </a:extLst>
 </a:theme>
+</file>
+
+<file path=ppt/theme/theme2.xml><?xml version="1.0" encoding="utf-8"?>
+<a:theme xmlns:a="http://schemas.openxmlformats.org/drawingml/2006/main" name="Office Theme">
+  <a:themeElements>
+    <a:clrScheme name="Office">
+      <a:dk1>
+        <a:sysClr val="windowText" lastClr="000000"/>
+      </a:dk1>
+      <a:lt1>
+        <a:sysClr val="window" lastClr="FFFFFF"/>
+      </a:lt1>
+      <a:dk2>
+        <a:srgbClr val="44546A"/>
+      </a:dk2>
+      <a:lt2>
+        <a:srgbClr val="E7E6E6"/>
+      </a:lt2>
+      <a:accent1>
+        <a:srgbClr val="4472C4"/>
+      </a:accent1>
+      <a:accent2>
+        <a:srgbClr val="ED7D31"/>
+      </a:accent2>
+      <a:accent3>
+        <a:srgbClr val="A5A5A5"/>
+      </a:accent3>
+      <a:accent4>
+        <a:srgbClr val="FFC000"/>
+      </a:accent4>
+      <a:accent5>
+        <a:srgbClr val="5B9BD5"/>
+      </a:accent5>
+      <a:accent6>
+        <a:srgbClr val="70AD47"/>
+      </a:accent6>
+      <a:hlink>
+        <a:srgbClr val="0563C1"/>
+      </a:hlink>
+      <a:folHlink>
+        <a:srgbClr val="954F72"/>
+      </a:folHlink>
+    </a:clrScheme>
+    <a:fontScheme name="Office">
+      <a:majorFont>
+        <a:latin typeface="Calibri Light" panose="020F0302020204030204"/>
+        <a:ea typeface=""/>
+        <a:cs typeface=""/>
+        <a:font script="Jpan" typeface="游ゴシック Light"/>
+        <a:font script="Hang" typeface="맑은 고딕"/>
+        <a:font script="Hans" typeface="等线 Light"/>
+        <a:font script="Hant" typeface="新細明體"/>
+        <a:font script="Arab" typeface="Times New Roman"/>
+        <a:font script="Hebr" typeface="Times New Roman"/>
+        <a:font script="Thai" typeface="Angsana New"/>
+        <a:font script="Ethi" typeface="Nyala"/>
+        <a:font script="Beng" typeface="Vrinda"/>
+        <a:font script="Gujr" typeface="Shruti"/>
+        <a:font script="Khmr" typeface="MoolBoran"/>
+        <a:font script="Knda" typeface="Tunga"/>
+        <a:font script="Guru" typeface="Raavi"/>
+        <a:font script="Cans" typeface="Euphemia"/>
+        <a:font script="Cher" typeface="Plantagenet Cherokee"/>
+        <a:font script="Yiii" typeface="Microsoft Yi Baiti"/>
+        <a:font script="Tibt" typeface="Microsoft Himalaya"/>
+        <a:font script="Thaa" typeface="MV Boli"/>
+        <a:font script="Deva" typeface="Mangal"/>
+        <a:font script="Telu" typeface="Gautami"/>
+        <a:font script="Taml" typeface="Latha"/>
+        <a:font script="Syrc" typeface="Estrangelo Edessa"/>
+        <a:font script="Orya" typeface="Kalinga"/>
+        <a:font script="Mlym" typeface="Kartika"/>
+        <a:font script="Laoo" typeface="DokChampa"/>
+        <a:font script="Sinh" typeface="Iskoola Pota"/>
+        <a:font script="Mong" typeface="Mongolian Baiti"/>
+        <a:font script="Viet" typeface="Times New Roman"/>
+        <a:font script="Uigh" typeface="Microsoft Uighur"/>
+        <a:font script="Geor" typeface="Sylfaen"/>
+        <a:font script="Armn" typeface="Arial"/>
+        <a:font script="Bugi" typeface="Leelawadee UI"/>
+        <a:font script="Bopo" typeface="Microsoft JhengHei"/>
+        <a:font script="Java" typeface="Javanese Text"/>
+        <a:font script="Lisu" typeface="Segoe UI"/>
+        <a:font script="Mymr" typeface="Myanmar Text"/>
+        <a:font script="Nkoo" typeface="Ebrima"/>
+        <a:font script="Olck" typeface="Nirmala UI"/>
+        <a:font script="Osma" typeface="Ebrima"/>
+        <a:font script="Phag" typeface="Phagspa"/>
+        <a:font script="Syrn" typeface="Estrangelo Edessa"/>
+        <a:font script="Syrj" typeface="Estrangelo Edessa"/>
+        <a:font script="Syre" typeface="Estrangelo Edessa"/>
+        <a:font script="Sora" typeface="Nirmala UI"/>
+        <a:font script="Tale" typeface="Microsoft Tai Le"/>
+        <a:font script="Talu" typeface="Microsoft New Tai Lue"/>
+        <a:font script="Tfng" typeface="Ebrima"/>
+      </a:majorFont>
+      <a:minorFont>
+        <a:latin typeface="Calibri" panose="020F0502020204030204"/>
+        <a:ea typeface=""/>
+        <a:cs typeface=""/>
+        <a:font script="Jpan" typeface="游ゴシック"/>
+        <a:font script="Hang" typeface="맑은 고딕"/>
+        <a:font script="Hans" typeface="等线"/>
+        <a:font script="Hant" typeface="新細明體"/>
+        <a:font script="Arab" typeface="Arial"/>
+        <a:font script="Hebr" typeface="Arial"/>
+        <a:font script="Thai" typeface="Cordia New"/>
+        <a:font script="Ethi" typeface="Nyala"/>
+        <a:font script="Beng" typeface="Vrinda"/>
+        <a:font script="Gujr" typeface="Shruti"/>
+        <a:font script="Khmr" typeface="DaunPenh"/>
+        <a:font script="Knda" typeface="Tunga"/>
+        <a:font script="Guru" typeface="Raavi"/>
+        <a:font script="Cans" typeface="Euphemia"/>
+        <a:font script="Cher" typeface="Plantagenet Cherokee"/>
+        <a:font script="Yiii" typeface="Microsoft Yi Baiti"/>
+        <a:font script="Tibt" typeface="Microsoft Himalaya"/>
+        <a:font script="Thaa" typeface="MV Boli"/>
+        <a:font script="Deva" typeface="Mangal"/>
+        <a:font script="Telu" typeface="Gautami"/>
+        <a:font script="Taml" typeface="Latha"/>
+        <a:font script="Syrc" typeface="Estrangelo Edessa"/>
+        <a:font script="Orya" typeface="Kalinga"/>
+        <a:font script="Mlym" typeface="Kartika"/>
+        <a:font script="Laoo" typeface="DokChampa"/>
+        <a:font script="Sinh" typeface="Iskoola Pota"/>
+        <a:font script="Mong" typeface="Mongolian Baiti"/>
+        <a:font script="Viet" typeface="Arial"/>
+        <a:font script="Uigh" typeface="Microsoft Uighur"/>
+        <a:font script="Geor" typeface="Sylfaen"/>
+        <a:font script="Armn" typeface="Arial"/>
+        <a:font script="Bugi" typeface="Leelawadee UI"/>
+        <a:font script="Bopo" typeface="Microsoft JhengHei"/>
+        <a:font script="Java" typeface="Javanese Text"/>
+        <a:font script="Lisu" typeface="Segoe UI"/>
+        <a:font script="Mymr" typeface="Myanmar Text"/>
+        <a:font script="Nkoo" typeface="Ebrima"/>
+        <a:font script="Olck" typeface="Nirmala UI"/>
+        <a:font script="Osma" typeface="Ebrima"/>
+        <a:font script="Phag" typeface="Phagspa"/>
+        <a:font script="Syrn" typeface="Estrangelo Edessa"/>
+        <a:font script="Syrj" typeface="Estrangelo Edessa"/>
+        <a:font script="Syre" typeface="Estrangelo Edessa"/>
+        <a:font script="Sora" typeface="Nirmala UI"/>
+        <a:font script="Tale" typeface="Microsoft Tai Le"/>
+        <a:font script="Talu" typeface="Microsoft New Tai Lue"/>
+        <a:font script="Tfng" typeface="Ebrima"/>
+      </a:minorFont>
+    </a:fontScheme>
+    <a:fmtScheme name="Office">
+      <a:fillStyleLst>
+        <a:solidFill>
+          <a:schemeClr val="phClr"/>
+        </a:solidFill>
+        <a:gradFill rotWithShape="1">
+          <a:gsLst>
+            <a:gs pos="0">
+              <a:schemeClr val="phClr">
+                <a:lumMod val="110000"/>
+                <a:satMod val="105000"/>
+                <a:tint val="67000"/>
+              </a:schemeClr>
+            </a:gs>
+            <a:gs pos="50000">
+              <a:schemeClr val="phClr">
+                <a:lumMod val="105000"/>
+                <a:satMod val="103000"/>
+                <a:tint val="73000"/>
+              </a:schemeClr>
+            </a:gs>
+            <a:gs pos="100000">
+              <a:schemeClr val="phClr">
+                <a:lumMod val="105000"/>
+                <a:satMod val="109000"/>
+                <a:tint val="81000"/>
+              </a:schemeClr>
+            </a:gs>
+          </a:gsLst>
+          <a:lin ang="5400000" scaled="0"/>
+        </a:gradFill>
+        <a:gradFill rotWithShape="1">
+          <a:gsLst>
+            <a:gs pos="0">
+              <a:schemeClr val="phClr">
+                <a:satMod val="103000"/>
+                <a:lumMod val="102000"/>
+                <a:tint val="94000"/>
+              </a:schemeClr>
+            </a:gs>
+            <a:gs pos="50000">
+              <a:schemeClr val="phClr">
+                <a:satMod val="110000"/>
+                <a:lumMod val="100000"/>
+                <a:shade val="100000"/>
+              </a:schemeClr>
+            </a:gs>
+            <a:gs pos="100000">
+              <a:schemeClr val="phClr">
+                <a:lumMod val="99000"/>
+                <a:satMod val="120000"/>
+                <a:shade val="78000"/>
+              </a:schemeClr>
+            </a:gs>
+          </a:gsLst>
+          <a:lin ang="5400000" scaled="0"/>
+        </a:gradFill>
+      </a:fillStyleLst>
+      <a:lnStyleLst>
+        <a:ln w="6350" cap="flat" cmpd="sng" algn="ctr">
+          <a:solidFill>
+            <a:schemeClr val="phClr"/>
+          </a:solidFill>
+          <a:prstDash val="solid"/>
+          <a:miter lim="800000"/>
+        </a:ln>
+        <a:ln w="12700" cap="flat" cmpd="sng" algn="ctr">
+          <a:solidFill>
+            <a:schemeClr val="phClr"/>
+          </a:solidFill>
+          <a:prstDash val="solid"/>
+          <a:miter lim="800000"/>
+        </a:ln>
+        <a:ln w="19050" cap="flat" cmpd="sng" algn="ctr">
+          <a:solidFill>
+            <a:schemeClr val="phClr"/>
+          </a:solidFill>
+          <a:prstDash val="solid"/>
+          <a:miter lim="800000"/>
+        </a:ln>
+      </a:lnStyleLst>
+      <a:effectStyleLst>
+        <a:effectStyle>
+          <a:effectLst/>
+        </a:effectStyle>
+        <a:effectStyle>
+          <a:effectLst/>
+        </a:effectStyle>
+        <a:effectStyle>
+          <a:effectLst>
+            <a:outerShdw blurRad="57150" dist="19050" dir="5400000" algn="ctr" rotWithShape="0">
+              <a:srgbClr val="000000">
+                <a:alpha val="63000"/>
+              </a:srgbClr>
+            </a:outerShdw>
+          </a:effectLst>
+        </a:effectStyle>
+      </a:effectStyleLst>
+      <a:bgFillStyleLst>
+        <a:solidFill>
+          <a:schemeClr val="phClr"/>
+        </a:solidFill>
+        <a:solidFill>
+          <a:schemeClr val="phClr">
+            <a:tint val="95000"/>
+            <a:satMod val="170000"/>
+          </a:schemeClr>
+        </a:solidFill>
+        <a:gradFill rotWithShape="1">
+          <a:gsLst>
+            <a:gs pos="0">
+              <a:schemeClr val="phClr">
+                <a:tint val="93000"/>
+                <a:satMod val="150000"/>
+                <a:shade val="98000"/>
+                <a:lumMod val="102000"/>
+              </a:schemeClr>
+            </a:gs>
+            <a:gs pos="50000">
+              <a:schemeClr val="phClr">
+                <a:tint val="98000"/>
+                <a:satMod val="130000"/>
+                <a:shade val="90000"/>
+                <a:lumMod val="103000"/>
+              </a:schemeClr>
+            </a:gs>
+            <a:gs pos="100000">
+              <a:schemeClr val="phClr">
+                <a:shade val="63000"/>
+                <a:satMod val="120000"/>
+              </a:schemeClr>
+            </a:gs>
+          </a:gsLst>
+          <a:lin ang="5400000" scaled="0"/>
+        </a:gradFill>
+      </a:bgFillStyleLst>
+    </a:fmtScheme>
+  </a:themeElements>
+  <a:objectDefaults/>
+  <a:extraClrSchemeLst/>
+  <a:extLst>
+    <a:ext uri="{05A4C25C-085E-4340-85A3-A5531E510DB2}">
+      <thm15:themeFamily xmlns:thm15="http://schemas.microsoft.com/office/thememl/2012/main" name="Office Theme" id="{62F939B6-93AF-4DB8-9C6B-D6C7DFDC589F}" vid="{4A3C46E8-61CC-4603-A589-7422A47A8E4A}"/>
+    </a:ext>
+  </a:extLst>
+</a:theme>
 </file>
</xml_diff>